<commit_message>
Figure updates and such
</commit_message>
<xml_diff>
--- a/Pictures/Figures/Figure 11.pptx
+++ b/Pictures/Figures/Figure 11.pptx
@@ -7,7 +7,7 @@
   <p:sldIdLst>
     <p:sldId id="256" r:id="rId2"/>
   </p:sldIdLst>
-  <p:sldSz cx="9144000" cy="3876675"/>
+  <p:sldSz cx="9144000" cy="4572000"/>
   <p:notesSz cx="6858000" cy="9144000"/>
   <p:defaultTextStyle>
     <a:defPPr>
@@ -104,6 +104,11 @@
       </a:defRPr>
     </a:lvl9pPr>
   </p:defaultTextStyle>
+  <p:extLst>
+    <p:ext uri="{EFAFB233-063F-42B5-8137-9DF3F51BA10A}">
+      <p15:sldGuideLst xmlns:p15="http://schemas.microsoft.com/office/powerpoint/2012/main"/>
+    </p:ext>
+  </p:extLst>
 </p:presentation>
 </file>
 
@@ -136,15 +141,15 @@
         </p:nvSpPr>
         <p:spPr>
           <a:xfrm>
-            <a:off x="1143000" y="634447"/>
-            <a:ext cx="6858000" cy="1349657"/>
+            <a:off x="1143000" y="748242"/>
+            <a:ext cx="6858000" cy="1591733"/>
           </a:xfrm>
         </p:spPr>
         <p:txBody>
           <a:bodyPr anchor="b"/>
           <a:lstStyle>
             <a:lvl1pPr algn="ctr">
-              <a:defRPr sz="3392"/>
+              <a:defRPr sz="4000"/>
             </a:lvl1pPr>
           </a:lstStyle>
           <a:p>
@@ -168,8 +173,8 @@
         </p:nvSpPr>
         <p:spPr>
           <a:xfrm>
-            <a:off x="1143000" y="2036152"/>
-            <a:ext cx="6858000" cy="935965"/>
+            <a:off x="1143000" y="2401359"/>
+            <a:ext cx="6858000" cy="1103841"/>
           </a:xfrm>
         </p:spPr>
         <p:txBody>
@@ -177,39 +182,39 @@
           <a:lstStyle>
             <a:lvl1pPr marL="0" indent="0" algn="ctr">
               <a:buNone/>
-              <a:defRPr sz="1357"/>
+              <a:defRPr sz="1600"/>
             </a:lvl1pPr>
-            <a:lvl2pPr marL="258455" indent="0" algn="ctr">
-              <a:buNone/>
-              <a:defRPr sz="1131"/>
+            <a:lvl2pPr marL="304815" indent="0" algn="ctr">
+              <a:buNone/>
+              <a:defRPr sz="1333"/>
             </a:lvl2pPr>
-            <a:lvl3pPr marL="516910" indent="0" algn="ctr">
-              <a:buNone/>
-              <a:defRPr sz="1018"/>
+            <a:lvl3pPr marL="609630" indent="0" algn="ctr">
+              <a:buNone/>
+              <a:defRPr sz="1200"/>
             </a:lvl3pPr>
-            <a:lvl4pPr marL="775365" indent="0" algn="ctr">
-              <a:buNone/>
-              <a:defRPr sz="904"/>
+            <a:lvl4pPr marL="914446" indent="0" algn="ctr">
+              <a:buNone/>
+              <a:defRPr sz="1067"/>
             </a:lvl4pPr>
-            <a:lvl5pPr marL="1033821" indent="0" algn="ctr">
-              <a:buNone/>
-              <a:defRPr sz="904"/>
+            <a:lvl5pPr marL="1219261" indent="0" algn="ctr">
+              <a:buNone/>
+              <a:defRPr sz="1067"/>
             </a:lvl5pPr>
-            <a:lvl6pPr marL="1292276" indent="0" algn="ctr">
-              <a:buNone/>
-              <a:defRPr sz="904"/>
+            <a:lvl6pPr marL="1524076" indent="0" algn="ctr">
+              <a:buNone/>
+              <a:defRPr sz="1067"/>
             </a:lvl6pPr>
-            <a:lvl7pPr marL="1550731" indent="0" algn="ctr">
-              <a:buNone/>
-              <a:defRPr sz="904"/>
+            <a:lvl7pPr marL="1828891" indent="0" algn="ctr">
+              <a:buNone/>
+              <a:defRPr sz="1067"/>
             </a:lvl7pPr>
-            <a:lvl8pPr marL="1809186" indent="0" algn="ctr">
-              <a:buNone/>
-              <a:defRPr sz="904"/>
+            <a:lvl8pPr marL="2133707" indent="0" algn="ctr">
+              <a:buNone/>
+              <a:defRPr sz="1067"/>
             </a:lvl8pPr>
-            <a:lvl9pPr marL="2067641" indent="0" algn="ctr">
-              <a:buNone/>
-              <a:defRPr sz="904"/>
+            <a:lvl9pPr marL="2438522" indent="0" algn="ctr">
+              <a:buNone/>
+              <a:defRPr sz="1067"/>
             </a:lvl9pPr>
           </a:lstStyle>
           <a:p>
@@ -236,9 +241,9 @@
           <a:bodyPr/>
           <a:lstStyle/>
           <a:p>
-            <a:fld id="{57E35D0E-E418-4062-98A5-776A4A383B9E}" type="datetimeFigureOut">
+            <a:fld id="{DF659CEE-7ED8-4475-A00F-9EBDFFED20DC}" type="datetimeFigureOut">
               <a:rPr lang="en-US" smtClean="0"/>
-              <a:t>11/4/2022</a:t>
+              <a:t>11/7/2022</a:t>
             </a:fld>
             <a:endParaRPr lang="en-US"/>
           </a:p>
@@ -278,7 +283,7 @@
           <a:bodyPr/>
           <a:lstStyle/>
           <a:p>
-            <a:fld id="{ADE6DB20-65B8-4F71-BC10-5EEDC6890FBB}" type="slidenum">
+            <a:fld id="{D56A7904-AA9B-462C-AA52-53D2A1F03E28}" type="slidenum">
               <a:rPr lang="en-US" smtClean="0"/>
               <a:t>‹#›</a:t>
             </a:fld>
@@ -289,7 +294,7 @@
     </p:spTree>
     <p:extLst>
       <p:ext uri="{BB962C8B-B14F-4D97-AF65-F5344CB8AC3E}">
-        <p14:creationId xmlns:p14="http://schemas.microsoft.com/office/powerpoint/2010/main" val="7542009"/>
+        <p14:creationId xmlns:p14="http://schemas.microsoft.com/office/powerpoint/2010/main" val="1659604076"/>
       </p:ext>
     </p:extLst>
   </p:cSld>
@@ -406,9 +411,9 @@
           <a:bodyPr/>
           <a:lstStyle/>
           <a:p>
-            <a:fld id="{57E35D0E-E418-4062-98A5-776A4A383B9E}" type="datetimeFigureOut">
+            <a:fld id="{DF659CEE-7ED8-4475-A00F-9EBDFFED20DC}" type="datetimeFigureOut">
               <a:rPr lang="en-US" smtClean="0"/>
-              <a:t>11/4/2022</a:t>
+              <a:t>11/7/2022</a:t>
             </a:fld>
             <a:endParaRPr lang="en-US"/>
           </a:p>
@@ -448,7 +453,7 @@
           <a:bodyPr/>
           <a:lstStyle/>
           <a:p>
-            <a:fld id="{ADE6DB20-65B8-4F71-BC10-5EEDC6890FBB}" type="slidenum">
+            <a:fld id="{D56A7904-AA9B-462C-AA52-53D2A1F03E28}" type="slidenum">
               <a:rPr lang="en-US" smtClean="0"/>
               <a:t>‹#›</a:t>
             </a:fld>
@@ -459,7 +464,7 @@
     </p:spTree>
     <p:extLst>
       <p:ext uri="{BB962C8B-B14F-4D97-AF65-F5344CB8AC3E}">
-        <p14:creationId xmlns:p14="http://schemas.microsoft.com/office/powerpoint/2010/main" val="2162227179"/>
+        <p14:creationId xmlns:p14="http://schemas.microsoft.com/office/powerpoint/2010/main" val="4050145543"/>
       </p:ext>
     </p:extLst>
   </p:cSld>
@@ -498,8 +503,8 @@
         </p:nvSpPr>
         <p:spPr>
           <a:xfrm>
-            <a:off x="6543675" y="206397"/>
-            <a:ext cx="1971675" cy="3285303"/>
+            <a:off x="6543675" y="243417"/>
+            <a:ext cx="1971675" cy="3874559"/>
           </a:xfrm>
         </p:spPr>
         <p:txBody>
@@ -526,8 +531,8 @@
         </p:nvSpPr>
         <p:spPr>
           <a:xfrm>
-            <a:off x="628650" y="206397"/>
-            <a:ext cx="5800725" cy="3285303"/>
+            <a:off x="628650" y="243417"/>
+            <a:ext cx="5800725" cy="3874559"/>
           </a:xfrm>
         </p:spPr>
         <p:txBody>
@@ -586,9 +591,9 @@
           <a:bodyPr/>
           <a:lstStyle/>
           <a:p>
-            <a:fld id="{57E35D0E-E418-4062-98A5-776A4A383B9E}" type="datetimeFigureOut">
+            <a:fld id="{DF659CEE-7ED8-4475-A00F-9EBDFFED20DC}" type="datetimeFigureOut">
               <a:rPr lang="en-US" smtClean="0"/>
-              <a:t>11/4/2022</a:t>
+              <a:t>11/7/2022</a:t>
             </a:fld>
             <a:endParaRPr lang="en-US"/>
           </a:p>
@@ -628,7 +633,7 @@
           <a:bodyPr/>
           <a:lstStyle/>
           <a:p>
-            <a:fld id="{ADE6DB20-65B8-4F71-BC10-5EEDC6890FBB}" type="slidenum">
+            <a:fld id="{D56A7904-AA9B-462C-AA52-53D2A1F03E28}" type="slidenum">
               <a:rPr lang="en-US" smtClean="0"/>
               <a:t>‹#›</a:t>
             </a:fld>
@@ -639,7 +644,7 @@
     </p:spTree>
     <p:extLst>
       <p:ext uri="{BB962C8B-B14F-4D97-AF65-F5344CB8AC3E}">
-        <p14:creationId xmlns:p14="http://schemas.microsoft.com/office/powerpoint/2010/main" val="930508953"/>
+        <p14:creationId xmlns:p14="http://schemas.microsoft.com/office/powerpoint/2010/main" val="2813139676"/>
       </p:ext>
     </p:extLst>
   </p:cSld>
@@ -756,9 +761,9 @@
           <a:bodyPr/>
           <a:lstStyle/>
           <a:p>
-            <a:fld id="{57E35D0E-E418-4062-98A5-776A4A383B9E}" type="datetimeFigureOut">
+            <a:fld id="{DF659CEE-7ED8-4475-A00F-9EBDFFED20DC}" type="datetimeFigureOut">
               <a:rPr lang="en-US" smtClean="0"/>
-              <a:t>11/4/2022</a:t>
+              <a:t>11/7/2022</a:t>
             </a:fld>
             <a:endParaRPr lang="en-US"/>
           </a:p>
@@ -798,7 +803,7 @@
           <a:bodyPr/>
           <a:lstStyle/>
           <a:p>
-            <a:fld id="{ADE6DB20-65B8-4F71-BC10-5EEDC6890FBB}" type="slidenum">
+            <a:fld id="{D56A7904-AA9B-462C-AA52-53D2A1F03E28}" type="slidenum">
               <a:rPr lang="en-US" smtClean="0"/>
               <a:t>‹#›</a:t>
             </a:fld>
@@ -809,7 +814,7 @@
     </p:spTree>
     <p:extLst>
       <p:ext uri="{BB962C8B-B14F-4D97-AF65-F5344CB8AC3E}">
-        <p14:creationId xmlns:p14="http://schemas.microsoft.com/office/powerpoint/2010/main" val="1709009590"/>
+        <p14:creationId xmlns:p14="http://schemas.microsoft.com/office/powerpoint/2010/main" val="681558382"/>
       </p:ext>
     </p:extLst>
   </p:cSld>
@@ -848,15 +853,15 @@
         </p:nvSpPr>
         <p:spPr>
           <a:xfrm>
-            <a:off x="623888" y="966477"/>
-            <a:ext cx="7886700" cy="1612589"/>
+            <a:off x="623888" y="1139826"/>
+            <a:ext cx="7886700" cy="1901825"/>
           </a:xfrm>
         </p:spPr>
         <p:txBody>
           <a:bodyPr anchor="b"/>
           <a:lstStyle>
             <a:lvl1pPr>
-              <a:defRPr sz="3392"/>
+              <a:defRPr sz="4000"/>
             </a:lvl1pPr>
           </a:lstStyle>
           <a:p>
@@ -880,8 +885,8 @@
         </p:nvSpPr>
         <p:spPr>
           <a:xfrm>
-            <a:off x="623888" y="2594322"/>
-            <a:ext cx="7886700" cy="848022"/>
+            <a:off x="623888" y="3059642"/>
+            <a:ext cx="7886700" cy="1000125"/>
           </a:xfrm>
         </p:spPr>
         <p:txBody>
@@ -889,7 +894,7 @@
           <a:lstStyle>
             <a:lvl1pPr marL="0" indent="0">
               <a:buNone/>
-              <a:defRPr sz="1357">
+              <a:defRPr sz="1600">
                 <a:solidFill>
                   <a:schemeClr val="tx1">
                     <a:tint val="75000"/>
@@ -897,9 +902,9 @@
                 </a:solidFill>
               </a:defRPr>
             </a:lvl1pPr>
-            <a:lvl2pPr marL="258455" indent="0">
-              <a:buNone/>
-              <a:defRPr sz="1131">
+            <a:lvl2pPr marL="304815" indent="0">
+              <a:buNone/>
+              <a:defRPr sz="1333">
                 <a:solidFill>
                   <a:schemeClr val="tx1">
                     <a:tint val="75000"/>
@@ -907,9 +912,9 @@
                 </a:solidFill>
               </a:defRPr>
             </a:lvl2pPr>
-            <a:lvl3pPr marL="516910" indent="0">
-              <a:buNone/>
-              <a:defRPr sz="1018">
+            <a:lvl3pPr marL="609630" indent="0">
+              <a:buNone/>
+              <a:defRPr sz="1200">
                 <a:solidFill>
                   <a:schemeClr val="tx1">
                     <a:tint val="75000"/>
@@ -917,9 +922,9 @@
                 </a:solidFill>
               </a:defRPr>
             </a:lvl3pPr>
-            <a:lvl4pPr marL="775365" indent="0">
-              <a:buNone/>
-              <a:defRPr sz="904">
+            <a:lvl4pPr marL="914446" indent="0">
+              <a:buNone/>
+              <a:defRPr sz="1067">
                 <a:solidFill>
                   <a:schemeClr val="tx1">
                     <a:tint val="75000"/>
@@ -927,9 +932,9 @@
                 </a:solidFill>
               </a:defRPr>
             </a:lvl4pPr>
-            <a:lvl5pPr marL="1033821" indent="0">
-              <a:buNone/>
-              <a:defRPr sz="904">
+            <a:lvl5pPr marL="1219261" indent="0">
+              <a:buNone/>
+              <a:defRPr sz="1067">
                 <a:solidFill>
                   <a:schemeClr val="tx1">
                     <a:tint val="75000"/>
@@ -937,9 +942,9 @@
                 </a:solidFill>
               </a:defRPr>
             </a:lvl5pPr>
-            <a:lvl6pPr marL="1292276" indent="0">
-              <a:buNone/>
-              <a:defRPr sz="904">
+            <a:lvl6pPr marL="1524076" indent="0">
+              <a:buNone/>
+              <a:defRPr sz="1067">
                 <a:solidFill>
                   <a:schemeClr val="tx1">
                     <a:tint val="75000"/>
@@ -947,9 +952,9 @@
                 </a:solidFill>
               </a:defRPr>
             </a:lvl6pPr>
-            <a:lvl7pPr marL="1550731" indent="0">
-              <a:buNone/>
-              <a:defRPr sz="904">
+            <a:lvl7pPr marL="1828891" indent="0">
+              <a:buNone/>
+              <a:defRPr sz="1067">
                 <a:solidFill>
                   <a:schemeClr val="tx1">
                     <a:tint val="75000"/>
@@ -957,9 +962,9 @@
                 </a:solidFill>
               </a:defRPr>
             </a:lvl7pPr>
-            <a:lvl8pPr marL="1809186" indent="0">
-              <a:buNone/>
-              <a:defRPr sz="904">
+            <a:lvl8pPr marL="2133707" indent="0">
+              <a:buNone/>
+              <a:defRPr sz="1067">
                 <a:solidFill>
                   <a:schemeClr val="tx1">
                     <a:tint val="75000"/>
@@ -967,9 +972,9 @@
                 </a:solidFill>
               </a:defRPr>
             </a:lvl8pPr>
-            <a:lvl9pPr marL="2067641" indent="0">
-              <a:buNone/>
-              <a:defRPr sz="904">
+            <a:lvl9pPr marL="2438522" indent="0">
+              <a:buNone/>
+              <a:defRPr sz="1067">
                 <a:solidFill>
                   <a:schemeClr val="tx1">
                     <a:tint val="75000"/>
@@ -1002,9 +1007,9 @@
           <a:bodyPr/>
           <a:lstStyle/>
           <a:p>
-            <a:fld id="{57E35D0E-E418-4062-98A5-776A4A383B9E}" type="datetimeFigureOut">
+            <a:fld id="{DF659CEE-7ED8-4475-A00F-9EBDFFED20DC}" type="datetimeFigureOut">
               <a:rPr lang="en-US" smtClean="0"/>
-              <a:t>11/4/2022</a:t>
+              <a:t>11/7/2022</a:t>
             </a:fld>
             <a:endParaRPr lang="en-US"/>
           </a:p>
@@ -1044,7 +1049,7 @@
           <a:bodyPr/>
           <a:lstStyle/>
           <a:p>
-            <a:fld id="{ADE6DB20-65B8-4F71-BC10-5EEDC6890FBB}" type="slidenum">
+            <a:fld id="{D56A7904-AA9B-462C-AA52-53D2A1F03E28}" type="slidenum">
               <a:rPr lang="en-US" smtClean="0"/>
               <a:t>‹#›</a:t>
             </a:fld>
@@ -1055,7 +1060,7 @@
     </p:spTree>
     <p:extLst>
       <p:ext uri="{BB962C8B-B14F-4D97-AF65-F5344CB8AC3E}">
-        <p14:creationId xmlns:p14="http://schemas.microsoft.com/office/powerpoint/2010/main" val="710706960"/>
+        <p14:creationId xmlns:p14="http://schemas.microsoft.com/office/powerpoint/2010/main" val="1899211461"/>
       </p:ext>
     </p:extLst>
   </p:cSld>
@@ -1117,8 +1122,8 @@
         </p:nvSpPr>
         <p:spPr>
           <a:xfrm>
-            <a:off x="628650" y="1031985"/>
-            <a:ext cx="3886200" cy="2459715"/>
+            <a:off x="628650" y="1217083"/>
+            <a:ext cx="3886200" cy="2900892"/>
           </a:xfrm>
         </p:spPr>
         <p:txBody>
@@ -1174,8 +1179,8 @@
         </p:nvSpPr>
         <p:spPr>
           <a:xfrm>
-            <a:off x="4629150" y="1031985"/>
-            <a:ext cx="3886200" cy="2459715"/>
+            <a:off x="4629150" y="1217083"/>
+            <a:ext cx="3886200" cy="2900892"/>
           </a:xfrm>
         </p:spPr>
         <p:txBody>
@@ -1234,9 +1239,9 @@
           <a:bodyPr/>
           <a:lstStyle/>
           <a:p>
-            <a:fld id="{57E35D0E-E418-4062-98A5-776A4A383B9E}" type="datetimeFigureOut">
+            <a:fld id="{DF659CEE-7ED8-4475-A00F-9EBDFFED20DC}" type="datetimeFigureOut">
               <a:rPr lang="en-US" smtClean="0"/>
-              <a:t>11/4/2022</a:t>
+              <a:t>11/7/2022</a:t>
             </a:fld>
             <a:endParaRPr lang="en-US"/>
           </a:p>
@@ -1276,7 +1281,7 @@
           <a:bodyPr/>
           <a:lstStyle/>
           <a:p>
-            <a:fld id="{ADE6DB20-65B8-4F71-BC10-5EEDC6890FBB}" type="slidenum">
+            <a:fld id="{D56A7904-AA9B-462C-AA52-53D2A1F03E28}" type="slidenum">
               <a:rPr lang="en-US" smtClean="0"/>
               <a:t>‹#›</a:t>
             </a:fld>
@@ -1287,7 +1292,7 @@
     </p:spTree>
     <p:extLst>
       <p:ext uri="{BB962C8B-B14F-4D97-AF65-F5344CB8AC3E}">
-        <p14:creationId xmlns:p14="http://schemas.microsoft.com/office/powerpoint/2010/main" val="465443596"/>
+        <p14:creationId xmlns:p14="http://schemas.microsoft.com/office/powerpoint/2010/main" val="3844827066"/>
       </p:ext>
     </p:extLst>
   </p:cSld>
@@ -1326,8 +1331,8 @@
         </p:nvSpPr>
         <p:spPr>
           <a:xfrm>
-            <a:off x="629841" y="206397"/>
-            <a:ext cx="7886700" cy="749311"/>
+            <a:off x="629841" y="243417"/>
+            <a:ext cx="7886700" cy="883709"/>
           </a:xfrm>
         </p:spPr>
         <p:txBody>
@@ -1354,8 +1359,8 @@
         </p:nvSpPr>
         <p:spPr>
           <a:xfrm>
-            <a:off x="629842" y="950324"/>
-            <a:ext cx="3868340" cy="465739"/>
+            <a:off x="629842" y="1120775"/>
+            <a:ext cx="3868340" cy="549275"/>
           </a:xfrm>
         </p:spPr>
         <p:txBody>
@@ -1363,39 +1368,39 @@
           <a:lstStyle>
             <a:lvl1pPr marL="0" indent="0">
               <a:buNone/>
-              <a:defRPr sz="1357" b="1"/>
+              <a:defRPr sz="1600" b="1"/>
             </a:lvl1pPr>
-            <a:lvl2pPr marL="258455" indent="0">
-              <a:buNone/>
-              <a:defRPr sz="1131" b="1"/>
+            <a:lvl2pPr marL="304815" indent="0">
+              <a:buNone/>
+              <a:defRPr sz="1333" b="1"/>
             </a:lvl2pPr>
-            <a:lvl3pPr marL="516910" indent="0">
-              <a:buNone/>
-              <a:defRPr sz="1018" b="1"/>
+            <a:lvl3pPr marL="609630" indent="0">
+              <a:buNone/>
+              <a:defRPr sz="1200" b="1"/>
             </a:lvl3pPr>
-            <a:lvl4pPr marL="775365" indent="0">
-              <a:buNone/>
-              <a:defRPr sz="904" b="1"/>
+            <a:lvl4pPr marL="914446" indent="0">
+              <a:buNone/>
+              <a:defRPr sz="1067" b="1"/>
             </a:lvl4pPr>
-            <a:lvl5pPr marL="1033821" indent="0">
-              <a:buNone/>
-              <a:defRPr sz="904" b="1"/>
+            <a:lvl5pPr marL="1219261" indent="0">
+              <a:buNone/>
+              <a:defRPr sz="1067" b="1"/>
             </a:lvl5pPr>
-            <a:lvl6pPr marL="1292276" indent="0">
-              <a:buNone/>
-              <a:defRPr sz="904" b="1"/>
+            <a:lvl6pPr marL="1524076" indent="0">
+              <a:buNone/>
+              <a:defRPr sz="1067" b="1"/>
             </a:lvl6pPr>
-            <a:lvl7pPr marL="1550731" indent="0">
-              <a:buNone/>
-              <a:defRPr sz="904" b="1"/>
+            <a:lvl7pPr marL="1828891" indent="0">
+              <a:buNone/>
+              <a:defRPr sz="1067" b="1"/>
             </a:lvl7pPr>
-            <a:lvl8pPr marL="1809186" indent="0">
-              <a:buNone/>
-              <a:defRPr sz="904" b="1"/>
+            <a:lvl8pPr marL="2133707" indent="0">
+              <a:buNone/>
+              <a:defRPr sz="1067" b="1"/>
             </a:lvl8pPr>
-            <a:lvl9pPr marL="2067641" indent="0">
-              <a:buNone/>
-              <a:defRPr sz="904" b="1"/>
+            <a:lvl9pPr marL="2438522" indent="0">
+              <a:buNone/>
+              <a:defRPr sz="1067" b="1"/>
             </a:lvl9pPr>
           </a:lstStyle>
           <a:p>
@@ -1419,8 +1424,8 @@
         </p:nvSpPr>
         <p:spPr>
           <a:xfrm>
-            <a:off x="629842" y="1416063"/>
-            <a:ext cx="3868340" cy="2082816"/>
+            <a:off x="629842" y="1670050"/>
+            <a:ext cx="3868340" cy="2456392"/>
           </a:xfrm>
         </p:spPr>
         <p:txBody>
@@ -1476,8 +1481,8 @@
         </p:nvSpPr>
         <p:spPr>
           <a:xfrm>
-            <a:off x="4629150" y="950324"/>
-            <a:ext cx="3887391" cy="465739"/>
+            <a:off x="4629150" y="1120775"/>
+            <a:ext cx="3887391" cy="549275"/>
           </a:xfrm>
         </p:spPr>
         <p:txBody>
@@ -1485,39 +1490,39 @@
           <a:lstStyle>
             <a:lvl1pPr marL="0" indent="0">
               <a:buNone/>
-              <a:defRPr sz="1357" b="1"/>
+              <a:defRPr sz="1600" b="1"/>
             </a:lvl1pPr>
-            <a:lvl2pPr marL="258455" indent="0">
-              <a:buNone/>
-              <a:defRPr sz="1131" b="1"/>
+            <a:lvl2pPr marL="304815" indent="0">
+              <a:buNone/>
+              <a:defRPr sz="1333" b="1"/>
             </a:lvl2pPr>
-            <a:lvl3pPr marL="516910" indent="0">
-              <a:buNone/>
-              <a:defRPr sz="1018" b="1"/>
+            <a:lvl3pPr marL="609630" indent="0">
+              <a:buNone/>
+              <a:defRPr sz="1200" b="1"/>
             </a:lvl3pPr>
-            <a:lvl4pPr marL="775365" indent="0">
-              <a:buNone/>
-              <a:defRPr sz="904" b="1"/>
+            <a:lvl4pPr marL="914446" indent="0">
+              <a:buNone/>
+              <a:defRPr sz="1067" b="1"/>
             </a:lvl4pPr>
-            <a:lvl5pPr marL="1033821" indent="0">
-              <a:buNone/>
-              <a:defRPr sz="904" b="1"/>
+            <a:lvl5pPr marL="1219261" indent="0">
+              <a:buNone/>
+              <a:defRPr sz="1067" b="1"/>
             </a:lvl5pPr>
-            <a:lvl6pPr marL="1292276" indent="0">
-              <a:buNone/>
-              <a:defRPr sz="904" b="1"/>
+            <a:lvl6pPr marL="1524076" indent="0">
+              <a:buNone/>
+              <a:defRPr sz="1067" b="1"/>
             </a:lvl6pPr>
-            <a:lvl7pPr marL="1550731" indent="0">
-              <a:buNone/>
-              <a:defRPr sz="904" b="1"/>
+            <a:lvl7pPr marL="1828891" indent="0">
+              <a:buNone/>
+              <a:defRPr sz="1067" b="1"/>
             </a:lvl7pPr>
-            <a:lvl8pPr marL="1809186" indent="0">
-              <a:buNone/>
-              <a:defRPr sz="904" b="1"/>
+            <a:lvl8pPr marL="2133707" indent="0">
+              <a:buNone/>
+              <a:defRPr sz="1067" b="1"/>
             </a:lvl8pPr>
-            <a:lvl9pPr marL="2067641" indent="0">
-              <a:buNone/>
-              <a:defRPr sz="904" b="1"/>
+            <a:lvl9pPr marL="2438522" indent="0">
+              <a:buNone/>
+              <a:defRPr sz="1067" b="1"/>
             </a:lvl9pPr>
           </a:lstStyle>
           <a:p>
@@ -1541,8 +1546,8 @@
         </p:nvSpPr>
         <p:spPr>
           <a:xfrm>
-            <a:off x="4629150" y="1416063"/>
-            <a:ext cx="3887391" cy="2082816"/>
+            <a:off x="4629150" y="1670050"/>
+            <a:ext cx="3887391" cy="2456392"/>
           </a:xfrm>
         </p:spPr>
         <p:txBody>
@@ -1601,9 +1606,9 @@
           <a:bodyPr/>
           <a:lstStyle/>
           <a:p>
-            <a:fld id="{57E35D0E-E418-4062-98A5-776A4A383B9E}" type="datetimeFigureOut">
+            <a:fld id="{DF659CEE-7ED8-4475-A00F-9EBDFFED20DC}" type="datetimeFigureOut">
               <a:rPr lang="en-US" smtClean="0"/>
-              <a:t>11/4/2022</a:t>
+              <a:t>11/7/2022</a:t>
             </a:fld>
             <a:endParaRPr lang="en-US"/>
           </a:p>
@@ -1643,7 +1648,7 @@
           <a:bodyPr/>
           <a:lstStyle/>
           <a:p>
-            <a:fld id="{ADE6DB20-65B8-4F71-BC10-5EEDC6890FBB}" type="slidenum">
+            <a:fld id="{D56A7904-AA9B-462C-AA52-53D2A1F03E28}" type="slidenum">
               <a:rPr lang="en-US" smtClean="0"/>
               <a:t>‹#›</a:t>
             </a:fld>
@@ -1654,7 +1659,7 @@
     </p:spTree>
     <p:extLst>
       <p:ext uri="{BB962C8B-B14F-4D97-AF65-F5344CB8AC3E}">
-        <p14:creationId xmlns:p14="http://schemas.microsoft.com/office/powerpoint/2010/main" val="4222776879"/>
+        <p14:creationId xmlns:p14="http://schemas.microsoft.com/office/powerpoint/2010/main" val="1596915979"/>
       </p:ext>
     </p:extLst>
   </p:cSld>
@@ -1719,9 +1724,9 @@
           <a:bodyPr/>
           <a:lstStyle/>
           <a:p>
-            <a:fld id="{57E35D0E-E418-4062-98A5-776A4A383B9E}" type="datetimeFigureOut">
+            <a:fld id="{DF659CEE-7ED8-4475-A00F-9EBDFFED20DC}" type="datetimeFigureOut">
               <a:rPr lang="en-US" smtClean="0"/>
-              <a:t>11/4/2022</a:t>
+              <a:t>11/7/2022</a:t>
             </a:fld>
             <a:endParaRPr lang="en-US"/>
           </a:p>
@@ -1761,7 +1766,7 @@
           <a:bodyPr/>
           <a:lstStyle/>
           <a:p>
-            <a:fld id="{ADE6DB20-65B8-4F71-BC10-5EEDC6890FBB}" type="slidenum">
+            <a:fld id="{D56A7904-AA9B-462C-AA52-53D2A1F03E28}" type="slidenum">
               <a:rPr lang="en-US" smtClean="0"/>
               <a:t>‹#›</a:t>
             </a:fld>
@@ -1772,7 +1777,7 @@
     </p:spTree>
     <p:extLst>
       <p:ext uri="{BB962C8B-B14F-4D97-AF65-F5344CB8AC3E}">
-        <p14:creationId xmlns:p14="http://schemas.microsoft.com/office/powerpoint/2010/main" val="2268757701"/>
+        <p14:creationId xmlns:p14="http://schemas.microsoft.com/office/powerpoint/2010/main" val="2553747048"/>
       </p:ext>
     </p:extLst>
   </p:cSld>
@@ -1814,9 +1819,9 @@
           <a:bodyPr/>
           <a:lstStyle/>
           <a:p>
-            <a:fld id="{57E35D0E-E418-4062-98A5-776A4A383B9E}" type="datetimeFigureOut">
+            <a:fld id="{DF659CEE-7ED8-4475-A00F-9EBDFFED20DC}" type="datetimeFigureOut">
               <a:rPr lang="en-US" smtClean="0"/>
-              <a:t>11/4/2022</a:t>
+              <a:t>11/7/2022</a:t>
             </a:fld>
             <a:endParaRPr lang="en-US"/>
           </a:p>
@@ -1856,7 +1861,7 @@
           <a:bodyPr/>
           <a:lstStyle/>
           <a:p>
-            <a:fld id="{ADE6DB20-65B8-4F71-BC10-5EEDC6890FBB}" type="slidenum">
+            <a:fld id="{D56A7904-AA9B-462C-AA52-53D2A1F03E28}" type="slidenum">
               <a:rPr lang="en-US" smtClean="0"/>
               <a:t>‹#›</a:t>
             </a:fld>
@@ -1867,7 +1872,7 @@
     </p:spTree>
     <p:extLst>
       <p:ext uri="{BB962C8B-B14F-4D97-AF65-F5344CB8AC3E}">
-        <p14:creationId xmlns:p14="http://schemas.microsoft.com/office/powerpoint/2010/main" val="1975209583"/>
+        <p14:creationId xmlns:p14="http://schemas.microsoft.com/office/powerpoint/2010/main" val="14595500"/>
       </p:ext>
     </p:extLst>
   </p:cSld>
@@ -1906,15 +1911,15 @@
         </p:nvSpPr>
         <p:spPr>
           <a:xfrm>
-            <a:off x="629841" y="258445"/>
-            <a:ext cx="2949178" cy="904558"/>
+            <a:off x="629841" y="304800"/>
+            <a:ext cx="2949178" cy="1066800"/>
           </a:xfrm>
         </p:spPr>
         <p:txBody>
           <a:bodyPr anchor="b"/>
           <a:lstStyle>
             <a:lvl1pPr>
-              <a:defRPr sz="1809"/>
+              <a:defRPr sz="2133"/>
             </a:lvl1pPr>
           </a:lstStyle>
           <a:p>
@@ -1938,39 +1943,39 @@
         </p:nvSpPr>
         <p:spPr>
           <a:xfrm>
-            <a:off x="3887391" y="558170"/>
-            <a:ext cx="4629150" cy="2754952"/>
+            <a:off x="3887391" y="658284"/>
+            <a:ext cx="4629150" cy="3249083"/>
           </a:xfrm>
         </p:spPr>
         <p:txBody>
           <a:bodyPr/>
           <a:lstStyle>
             <a:lvl1pPr>
-              <a:defRPr sz="1809"/>
+              <a:defRPr sz="2133"/>
             </a:lvl1pPr>
             <a:lvl2pPr>
-              <a:defRPr sz="1583"/>
+              <a:defRPr sz="1867"/>
             </a:lvl2pPr>
             <a:lvl3pPr>
-              <a:defRPr sz="1357"/>
+              <a:defRPr sz="1600"/>
             </a:lvl3pPr>
             <a:lvl4pPr>
-              <a:defRPr sz="1131"/>
+              <a:defRPr sz="1333"/>
             </a:lvl4pPr>
             <a:lvl5pPr>
-              <a:defRPr sz="1131"/>
+              <a:defRPr sz="1333"/>
             </a:lvl5pPr>
             <a:lvl6pPr>
-              <a:defRPr sz="1131"/>
+              <a:defRPr sz="1333"/>
             </a:lvl6pPr>
             <a:lvl7pPr>
-              <a:defRPr sz="1131"/>
+              <a:defRPr sz="1333"/>
             </a:lvl7pPr>
             <a:lvl8pPr>
-              <a:defRPr sz="1131"/>
+              <a:defRPr sz="1333"/>
             </a:lvl8pPr>
             <a:lvl9pPr>
-              <a:defRPr sz="1131"/>
+              <a:defRPr sz="1333"/>
             </a:lvl9pPr>
           </a:lstStyle>
           <a:p>
@@ -2023,8 +2028,8 @@
         </p:nvSpPr>
         <p:spPr>
           <a:xfrm>
-            <a:off x="629841" y="1163002"/>
-            <a:ext cx="2949178" cy="2154606"/>
+            <a:off x="629841" y="1371600"/>
+            <a:ext cx="2949178" cy="2541059"/>
           </a:xfrm>
         </p:spPr>
         <p:txBody>
@@ -2032,39 +2037,39 @@
           <a:lstStyle>
             <a:lvl1pPr marL="0" indent="0">
               <a:buNone/>
-              <a:defRPr sz="904"/>
+              <a:defRPr sz="1067"/>
             </a:lvl1pPr>
-            <a:lvl2pPr marL="258455" indent="0">
-              <a:buNone/>
-              <a:defRPr sz="791"/>
+            <a:lvl2pPr marL="304815" indent="0">
+              <a:buNone/>
+              <a:defRPr sz="933"/>
             </a:lvl2pPr>
-            <a:lvl3pPr marL="516910" indent="0">
-              <a:buNone/>
-              <a:defRPr sz="678"/>
+            <a:lvl3pPr marL="609630" indent="0">
+              <a:buNone/>
+              <a:defRPr sz="800"/>
             </a:lvl3pPr>
-            <a:lvl4pPr marL="775365" indent="0">
-              <a:buNone/>
-              <a:defRPr sz="565"/>
+            <a:lvl4pPr marL="914446" indent="0">
+              <a:buNone/>
+              <a:defRPr sz="667"/>
             </a:lvl4pPr>
-            <a:lvl5pPr marL="1033821" indent="0">
-              <a:buNone/>
-              <a:defRPr sz="565"/>
+            <a:lvl5pPr marL="1219261" indent="0">
+              <a:buNone/>
+              <a:defRPr sz="667"/>
             </a:lvl5pPr>
-            <a:lvl6pPr marL="1292276" indent="0">
-              <a:buNone/>
-              <a:defRPr sz="565"/>
+            <a:lvl6pPr marL="1524076" indent="0">
+              <a:buNone/>
+              <a:defRPr sz="667"/>
             </a:lvl6pPr>
-            <a:lvl7pPr marL="1550731" indent="0">
-              <a:buNone/>
-              <a:defRPr sz="565"/>
+            <a:lvl7pPr marL="1828891" indent="0">
+              <a:buNone/>
+              <a:defRPr sz="667"/>
             </a:lvl7pPr>
-            <a:lvl8pPr marL="1809186" indent="0">
-              <a:buNone/>
-              <a:defRPr sz="565"/>
+            <a:lvl8pPr marL="2133707" indent="0">
+              <a:buNone/>
+              <a:defRPr sz="667"/>
             </a:lvl8pPr>
-            <a:lvl9pPr marL="2067641" indent="0">
-              <a:buNone/>
-              <a:defRPr sz="565"/>
+            <a:lvl9pPr marL="2438522" indent="0">
+              <a:buNone/>
+              <a:defRPr sz="667"/>
             </a:lvl9pPr>
           </a:lstStyle>
           <a:p>
@@ -2091,9 +2096,9 @@
           <a:bodyPr/>
           <a:lstStyle/>
           <a:p>
-            <a:fld id="{57E35D0E-E418-4062-98A5-776A4A383B9E}" type="datetimeFigureOut">
+            <a:fld id="{DF659CEE-7ED8-4475-A00F-9EBDFFED20DC}" type="datetimeFigureOut">
               <a:rPr lang="en-US" smtClean="0"/>
-              <a:t>11/4/2022</a:t>
+              <a:t>11/7/2022</a:t>
             </a:fld>
             <a:endParaRPr lang="en-US"/>
           </a:p>
@@ -2133,7 +2138,7 @@
           <a:bodyPr/>
           <a:lstStyle/>
           <a:p>
-            <a:fld id="{ADE6DB20-65B8-4F71-BC10-5EEDC6890FBB}" type="slidenum">
+            <a:fld id="{D56A7904-AA9B-462C-AA52-53D2A1F03E28}" type="slidenum">
               <a:rPr lang="en-US" smtClean="0"/>
               <a:t>‹#›</a:t>
             </a:fld>
@@ -2144,7 +2149,7 @@
     </p:spTree>
     <p:extLst>
       <p:ext uri="{BB962C8B-B14F-4D97-AF65-F5344CB8AC3E}">
-        <p14:creationId xmlns:p14="http://schemas.microsoft.com/office/powerpoint/2010/main" val="3156257539"/>
+        <p14:creationId xmlns:p14="http://schemas.microsoft.com/office/powerpoint/2010/main" val="184106293"/>
       </p:ext>
     </p:extLst>
   </p:cSld>
@@ -2183,15 +2188,15 @@
         </p:nvSpPr>
         <p:spPr>
           <a:xfrm>
-            <a:off x="629841" y="258445"/>
-            <a:ext cx="2949178" cy="904558"/>
+            <a:off x="629841" y="304800"/>
+            <a:ext cx="2949178" cy="1066800"/>
           </a:xfrm>
         </p:spPr>
         <p:txBody>
           <a:bodyPr anchor="b"/>
           <a:lstStyle>
             <a:lvl1pPr>
-              <a:defRPr sz="1809"/>
+              <a:defRPr sz="2133"/>
             </a:lvl1pPr>
           </a:lstStyle>
           <a:p>
@@ -2215,8 +2220,8 @@
         </p:nvSpPr>
         <p:spPr>
           <a:xfrm>
-            <a:off x="3887391" y="558170"/>
-            <a:ext cx="4629150" cy="2754952"/>
+            <a:off x="3887391" y="658284"/>
+            <a:ext cx="4629150" cy="3249083"/>
           </a:xfrm>
         </p:spPr>
         <p:txBody>
@@ -2224,39 +2229,39 @@
           <a:lstStyle>
             <a:lvl1pPr marL="0" indent="0">
               <a:buNone/>
-              <a:defRPr sz="1809"/>
+              <a:defRPr sz="2133"/>
             </a:lvl1pPr>
-            <a:lvl2pPr marL="258455" indent="0">
-              <a:buNone/>
-              <a:defRPr sz="1583"/>
+            <a:lvl2pPr marL="304815" indent="0">
+              <a:buNone/>
+              <a:defRPr sz="1867"/>
             </a:lvl2pPr>
-            <a:lvl3pPr marL="516910" indent="0">
-              <a:buNone/>
-              <a:defRPr sz="1357"/>
+            <a:lvl3pPr marL="609630" indent="0">
+              <a:buNone/>
+              <a:defRPr sz="1600"/>
             </a:lvl3pPr>
-            <a:lvl4pPr marL="775365" indent="0">
-              <a:buNone/>
-              <a:defRPr sz="1131"/>
+            <a:lvl4pPr marL="914446" indent="0">
+              <a:buNone/>
+              <a:defRPr sz="1333"/>
             </a:lvl4pPr>
-            <a:lvl5pPr marL="1033821" indent="0">
-              <a:buNone/>
-              <a:defRPr sz="1131"/>
+            <a:lvl5pPr marL="1219261" indent="0">
+              <a:buNone/>
+              <a:defRPr sz="1333"/>
             </a:lvl5pPr>
-            <a:lvl6pPr marL="1292276" indent="0">
-              <a:buNone/>
-              <a:defRPr sz="1131"/>
+            <a:lvl6pPr marL="1524076" indent="0">
+              <a:buNone/>
+              <a:defRPr sz="1333"/>
             </a:lvl6pPr>
-            <a:lvl7pPr marL="1550731" indent="0">
-              <a:buNone/>
-              <a:defRPr sz="1131"/>
+            <a:lvl7pPr marL="1828891" indent="0">
+              <a:buNone/>
+              <a:defRPr sz="1333"/>
             </a:lvl7pPr>
-            <a:lvl8pPr marL="1809186" indent="0">
-              <a:buNone/>
-              <a:defRPr sz="1131"/>
+            <a:lvl8pPr marL="2133707" indent="0">
+              <a:buNone/>
+              <a:defRPr sz="1333"/>
             </a:lvl8pPr>
-            <a:lvl9pPr marL="2067641" indent="0">
-              <a:buNone/>
-              <a:defRPr sz="1131"/>
+            <a:lvl9pPr marL="2438522" indent="0">
+              <a:buNone/>
+              <a:defRPr sz="1333"/>
             </a:lvl9pPr>
           </a:lstStyle>
           <a:p>
@@ -2280,8 +2285,8 @@
         </p:nvSpPr>
         <p:spPr>
           <a:xfrm>
-            <a:off x="629841" y="1163002"/>
-            <a:ext cx="2949178" cy="2154606"/>
+            <a:off x="629841" y="1371600"/>
+            <a:ext cx="2949178" cy="2541059"/>
           </a:xfrm>
         </p:spPr>
         <p:txBody>
@@ -2289,39 +2294,39 @@
           <a:lstStyle>
             <a:lvl1pPr marL="0" indent="0">
               <a:buNone/>
-              <a:defRPr sz="904"/>
+              <a:defRPr sz="1067"/>
             </a:lvl1pPr>
-            <a:lvl2pPr marL="258455" indent="0">
-              <a:buNone/>
-              <a:defRPr sz="791"/>
+            <a:lvl2pPr marL="304815" indent="0">
+              <a:buNone/>
+              <a:defRPr sz="933"/>
             </a:lvl2pPr>
-            <a:lvl3pPr marL="516910" indent="0">
-              <a:buNone/>
-              <a:defRPr sz="678"/>
+            <a:lvl3pPr marL="609630" indent="0">
+              <a:buNone/>
+              <a:defRPr sz="800"/>
             </a:lvl3pPr>
-            <a:lvl4pPr marL="775365" indent="0">
-              <a:buNone/>
-              <a:defRPr sz="565"/>
+            <a:lvl4pPr marL="914446" indent="0">
+              <a:buNone/>
+              <a:defRPr sz="667"/>
             </a:lvl4pPr>
-            <a:lvl5pPr marL="1033821" indent="0">
-              <a:buNone/>
-              <a:defRPr sz="565"/>
+            <a:lvl5pPr marL="1219261" indent="0">
+              <a:buNone/>
+              <a:defRPr sz="667"/>
             </a:lvl5pPr>
-            <a:lvl6pPr marL="1292276" indent="0">
-              <a:buNone/>
-              <a:defRPr sz="565"/>
+            <a:lvl6pPr marL="1524076" indent="0">
+              <a:buNone/>
+              <a:defRPr sz="667"/>
             </a:lvl6pPr>
-            <a:lvl7pPr marL="1550731" indent="0">
-              <a:buNone/>
-              <a:defRPr sz="565"/>
+            <a:lvl7pPr marL="1828891" indent="0">
+              <a:buNone/>
+              <a:defRPr sz="667"/>
             </a:lvl7pPr>
-            <a:lvl8pPr marL="1809186" indent="0">
-              <a:buNone/>
-              <a:defRPr sz="565"/>
+            <a:lvl8pPr marL="2133707" indent="0">
+              <a:buNone/>
+              <a:defRPr sz="667"/>
             </a:lvl8pPr>
-            <a:lvl9pPr marL="2067641" indent="0">
-              <a:buNone/>
-              <a:defRPr sz="565"/>
+            <a:lvl9pPr marL="2438522" indent="0">
+              <a:buNone/>
+              <a:defRPr sz="667"/>
             </a:lvl9pPr>
           </a:lstStyle>
           <a:p>
@@ -2348,9 +2353,9 @@
           <a:bodyPr/>
           <a:lstStyle/>
           <a:p>
-            <a:fld id="{57E35D0E-E418-4062-98A5-776A4A383B9E}" type="datetimeFigureOut">
+            <a:fld id="{DF659CEE-7ED8-4475-A00F-9EBDFFED20DC}" type="datetimeFigureOut">
               <a:rPr lang="en-US" smtClean="0"/>
-              <a:t>11/4/2022</a:t>
+              <a:t>11/7/2022</a:t>
             </a:fld>
             <a:endParaRPr lang="en-US"/>
           </a:p>
@@ -2390,7 +2395,7 @@
           <a:bodyPr/>
           <a:lstStyle/>
           <a:p>
-            <a:fld id="{ADE6DB20-65B8-4F71-BC10-5EEDC6890FBB}" type="slidenum">
+            <a:fld id="{D56A7904-AA9B-462C-AA52-53D2A1F03E28}" type="slidenum">
               <a:rPr lang="en-US" smtClean="0"/>
               <a:t>‹#›</a:t>
             </a:fld>
@@ -2401,7 +2406,7 @@
     </p:spTree>
     <p:extLst>
       <p:ext uri="{BB962C8B-B14F-4D97-AF65-F5344CB8AC3E}">
-        <p14:creationId xmlns:p14="http://schemas.microsoft.com/office/powerpoint/2010/main" val="1068548814"/>
+        <p14:creationId xmlns:p14="http://schemas.microsoft.com/office/powerpoint/2010/main" val="3521881686"/>
       </p:ext>
     </p:extLst>
   </p:cSld>
@@ -2445,8 +2450,8 @@
         </p:nvSpPr>
         <p:spPr>
           <a:xfrm>
-            <a:off x="628650" y="206397"/>
-            <a:ext cx="7886700" cy="749311"/>
+            <a:off x="628650" y="243417"/>
+            <a:ext cx="7886700" cy="883709"/>
           </a:xfrm>
           <a:prstGeom prst="rect">
             <a:avLst/>
@@ -2478,8 +2483,8 @@
         </p:nvSpPr>
         <p:spPr>
           <a:xfrm>
-            <a:off x="628650" y="1031985"/>
-            <a:ext cx="7886700" cy="2459715"/>
+            <a:off x="628650" y="1217083"/>
+            <a:ext cx="7886700" cy="2900892"/>
           </a:xfrm>
           <a:prstGeom prst="rect">
             <a:avLst/>
@@ -2540,8 +2545,8 @@
         </p:nvSpPr>
         <p:spPr>
           <a:xfrm>
-            <a:off x="628650" y="3593104"/>
-            <a:ext cx="2057400" cy="206397"/>
+            <a:off x="628650" y="4237567"/>
+            <a:ext cx="2057400" cy="243417"/>
           </a:xfrm>
           <a:prstGeom prst="rect">
             <a:avLst/>
@@ -2551,7 +2556,7 @@
           <a:bodyPr vert="horz" lIns="91440" tIns="45720" rIns="91440" bIns="45720" rtlCol="0" anchor="ctr"/>
           <a:lstStyle>
             <a:lvl1pPr algn="l">
-              <a:defRPr sz="678">
+              <a:defRPr sz="800">
                 <a:solidFill>
                   <a:schemeClr val="tx1">
                     <a:tint val="75000"/>
@@ -2561,9 +2566,9 @@
             </a:lvl1pPr>
           </a:lstStyle>
           <a:p>
-            <a:fld id="{57E35D0E-E418-4062-98A5-776A4A383B9E}" type="datetimeFigureOut">
+            <a:fld id="{DF659CEE-7ED8-4475-A00F-9EBDFFED20DC}" type="datetimeFigureOut">
               <a:rPr lang="en-US" smtClean="0"/>
-              <a:t>11/4/2022</a:t>
+              <a:t>11/7/2022</a:t>
             </a:fld>
             <a:endParaRPr lang="en-US"/>
           </a:p>
@@ -2581,8 +2586,8 @@
         </p:nvSpPr>
         <p:spPr>
           <a:xfrm>
-            <a:off x="3028950" y="3593104"/>
-            <a:ext cx="3086100" cy="206397"/>
+            <a:off x="3028950" y="4237567"/>
+            <a:ext cx="3086100" cy="243417"/>
           </a:xfrm>
           <a:prstGeom prst="rect">
             <a:avLst/>
@@ -2592,7 +2597,7 @@
           <a:bodyPr vert="horz" lIns="91440" tIns="45720" rIns="91440" bIns="45720" rtlCol="0" anchor="ctr"/>
           <a:lstStyle>
             <a:lvl1pPr algn="ctr">
-              <a:defRPr sz="678">
+              <a:defRPr sz="800">
                 <a:solidFill>
                   <a:schemeClr val="tx1">
                     <a:tint val="75000"/>
@@ -2618,8 +2623,8 @@
         </p:nvSpPr>
         <p:spPr>
           <a:xfrm>
-            <a:off x="6457950" y="3593104"/>
-            <a:ext cx="2057400" cy="206397"/>
+            <a:off x="6457950" y="4237567"/>
+            <a:ext cx="2057400" cy="243417"/>
           </a:xfrm>
           <a:prstGeom prst="rect">
             <a:avLst/>
@@ -2629,7 +2634,7 @@
           <a:bodyPr vert="horz" lIns="91440" tIns="45720" rIns="91440" bIns="45720" rtlCol="0" anchor="ctr"/>
           <a:lstStyle>
             <a:lvl1pPr algn="r">
-              <a:defRPr sz="678">
+              <a:defRPr sz="800">
                 <a:solidFill>
                   <a:schemeClr val="tx1">
                     <a:tint val="75000"/>
@@ -2639,7 +2644,7 @@
             </a:lvl1pPr>
           </a:lstStyle>
           <a:p>
-            <a:fld id="{ADE6DB20-65B8-4F71-BC10-5EEDC6890FBB}" type="slidenum">
+            <a:fld id="{D56A7904-AA9B-462C-AA52-53D2A1F03E28}" type="slidenum">
               <a:rPr lang="en-US" smtClean="0"/>
               <a:t>‹#›</a:t>
             </a:fld>
@@ -2650,7 +2655,7 @@
     </p:spTree>
     <p:extLst>
       <p:ext uri="{BB962C8B-B14F-4D97-AF65-F5344CB8AC3E}">
-        <p14:creationId xmlns:p14="http://schemas.microsoft.com/office/powerpoint/2010/main" val="446067346"/>
+        <p14:creationId xmlns:p14="http://schemas.microsoft.com/office/powerpoint/2010/main" val="888570336"/>
       </p:ext>
     </p:extLst>
   </p:cSld>
@@ -2670,7 +2675,7 @@
   </p:sldLayoutIdLst>
   <p:txStyles>
     <p:titleStyle>
-      <a:lvl1pPr algn="l" defTabSz="516910" rtl="0" eaLnBrk="1" latinLnBrk="0" hangingPunct="1">
+      <a:lvl1pPr algn="l" defTabSz="609630" rtl="0" eaLnBrk="1" latinLnBrk="0" hangingPunct="1">
         <a:lnSpc>
           <a:spcPct val="90000"/>
         </a:lnSpc>
@@ -2678,7 +2683,7 @@
           <a:spcPct val="0"/>
         </a:spcBef>
         <a:buNone/>
-        <a:defRPr sz="2487" kern="1200">
+        <a:defRPr sz="2933" kern="1200">
           <a:solidFill>
             <a:schemeClr val="tx1"/>
           </a:solidFill>
@@ -2689,16 +2694,16 @@
       </a:lvl1pPr>
     </p:titleStyle>
     <p:bodyStyle>
-      <a:lvl1pPr marL="129228" indent="-129228" algn="l" defTabSz="516910" rtl="0" eaLnBrk="1" latinLnBrk="0" hangingPunct="1">
+      <a:lvl1pPr marL="152408" indent="-152408" algn="l" defTabSz="609630" rtl="0" eaLnBrk="1" latinLnBrk="0" hangingPunct="1">
         <a:lnSpc>
           <a:spcPct val="90000"/>
         </a:lnSpc>
         <a:spcBef>
-          <a:spcPts val="565"/>
+          <a:spcPts val="667"/>
         </a:spcBef>
         <a:buFont typeface="Arial" panose="020B0604020202020204" pitchFamily="34" charset="0"/>
         <a:buChar char="•"/>
-        <a:defRPr sz="1583" kern="1200">
+        <a:defRPr sz="1867" kern="1200">
           <a:solidFill>
             <a:schemeClr val="tx1"/>
           </a:solidFill>
@@ -2707,16 +2712,16 @@
           <a:cs typeface="+mn-cs"/>
         </a:defRPr>
       </a:lvl1pPr>
-      <a:lvl2pPr marL="387683" indent="-129228" algn="l" defTabSz="516910" rtl="0" eaLnBrk="1" latinLnBrk="0" hangingPunct="1">
+      <a:lvl2pPr marL="457223" indent="-152408" algn="l" defTabSz="609630" rtl="0" eaLnBrk="1" latinLnBrk="0" hangingPunct="1">
         <a:lnSpc>
           <a:spcPct val="90000"/>
         </a:lnSpc>
         <a:spcBef>
-          <a:spcPts val="283"/>
+          <a:spcPts val="333"/>
         </a:spcBef>
         <a:buFont typeface="Arial" panose="020B0604020202020204" pitchFamily="34" charset="0"/>
         <a:buChar char="•"/>
-        <a:defRPr sz="1357" kern="1200">
+        <a:defRPr sz="1600" kern="1200">
           <a:solidFill>
             <a:schemeClr val="tx1"/>
           </a:solidFill>
@@ -2725,16 +2730,16 @@
           <a:cs typeface="+mn-cs"/>
         </a:defRPr>
       </a:lvl2pPr>
-      <a:lvl3pPr marL="646138" indent="-129228" algn="l" defTabSz="516910" rtl="0" eaLnBrk="1" latinLnBrk="0" hangingPunct="1">
+      <a:lvl3pPr marL="762038" indent="-152408" algn="l" defTabSz="609630" rtl="0" eaLnBrk="1" latinLnBrk="0" hangingPunct="1">
         <a:lnSpc>
           <a:spcPct val="90000"/>
         </a:lnSpc>
         <a:spcBef>
-          <a:spcPts val="283"/>
+          <a:spcPts val="333"/>
         </a:spcBef>
         <a:buFont typeface="Arial" panose="020B0604020202020204" pitchFamily="34" charset="0"/>
         <a:buChar char="•"/>
-        <a:defRPr sz="1131" kern="1200">
+        <a:defRPr sz="1333" kern="1200">
           <a:solidFill>
             <a:schemeClr val="tx1"/>
           </a:solidFill>
@@ -2743,16 +2748,16 @@
           <a:cs typeface="+mn-cs"/>
         </a:defRPr>
       </a:lvl3pPr>
-      <a:lvl4pPr marL="904593" indent="-129228" algn="l" defTabSz="516910" rtl="0" eaLnBrk="1" latinLnBrk="0" hangingPunct="1">
+      <a:lvl4pPr marL="1066853" indent="-152408" algn="l" defTabSz="609630" rtl="0" eaLnBrk="1" latinLnBrk="0" hangingPunct="1">
         <a:lnSpc>
           <a:spcPct val="90000"/>
         </a:lnSpc>
         <a:spcBef>
-          <a:spcPts val="283"/>
+          <a:spcPts val="333"/>
         </a:spcBef>
         <a:buFont typeface="Arial" panose="020B0604020202020204" pitchFamily="34" charset="0"/>
         <a:buChar char="•"/>
-        <a:defRPr sz="1018" kern="1200">
+        <a:defRPr sz="1200" kern="1200">
           <a:solidFill>
             <a:schemeClr val="tx1"/>
           </a:solidFill>
@@ -2761,16 +2766,16 @@
           <a:cs typeface="+mn-cs"/>
         </a:defRPr>
       </a:lvl4pPr>
-      <a:lvl5pPr marL="1163048" indent="-129228" algn="l" defTabSz="516910" rtl="0" eaLnBrk="1" latinLnBrk="0" hangingPunct="1">
+      <a:lvl5pPr marL="1371669" indent="-152408" algn="l" defTabSz="609630" rtl="0" eaLnBrk="1" latinLnBrk="0" hangingPunct="1">
         <a:lnSpc>
           <a:spcPct val="90000"/>
         </a:lnSpc>
         <a:spcBef>
-          <a:spcPts val="283"/>
+          <a:spcPts val="333"/>
         </a:spcBef>
         <a:buFont typeface="Arial" panose="020B0604020202020204" pitchFamily="34" charset="0"/>
         <a:buChar char="•"/>
-        <a:defRPr sz="1018" kern="1200">
+        <a:defRPr sz="1200" kern="1200">
           <a:solidFill>
             <a:schemeClr val="tx1"/>
           </a:solidFill>
@@ -2779,16 +2784,16 @@
           <a:cs typeface="+mn-cs"/>
         </a:defRPr>
       </a:lvl5pPr>
-      <a:lvl6pPr marL="1421503" indent="-129228" algn="l" defTabSz="516910" rtl="0" eaLnBrk="1" latinLnBrk="0" hangingPunct="1">
+      <a:lvl6pPr marL="1676484" indent="-152408" algn="l" defTabSz="609630" rtl="0" eaLnBrk="1" latinLnBrk="0" hangingPunct="1">
         <a:lnSpc>
           <a:spcPct val="90000"/>
         </a:lnSpc>
         <a:spcBef>
-          <a:spcPts val="283"/>
+          <a:spcPts val="333"/>
         </a:spcBef>
         <a:buFont typeface="Arial" panose="020B0604020202020204" pitchFamily="34" charset="0"/>
         <a:buChar char="•"/>
-        <a:defRPr sz="1018" kern="1200">
+        <a:defRPr sz="1200" kern="1200">
           <a:solidFill>
             <a:schemeClr val="tx1"/>
           </a:solidFill>
@@ -2797,16 +2802,16 @@
           <a:cs typeface="+mn-cs"/>
         </a:defRPr>
       </a:lvl6pPr>
-      <a:lvl7pPr marL="1679959" indent="-129228" algn="l" defTabSz="516910" rtl="0" eaLnBrk="1" latinLnBrk="0" hangingPunct="1">
+      <a:lvl7pPr marL="1981299" indent="-152408" algn="l" defTabSz="609630" rtl="0" eaLnBrk="1" latinLnBrk="0" hangingPunct="1">
         <a:lnSpc>
           <a:spcPct val="90000"/>
         </a:lnSpc>
         <a:spcBef>
-          <a:spcPts val="283"/>
+          <a:spcPts val="333"/>
         </a:spcBef>
         <a:buFont typeface="Arial" panose="020B0604020202020204" pitchFamily="34" charset="0"/>
         <a:buChar char="•"/>
-        <a:defRPr sz="1018" kern="1200">
+        <a:defRPr sz="1200" kern="1200">
           <a:solidFill>
             <a:schemeClr val="tx1"/>
           </a:solidFill>
@@ -2815,16 +2820,16 @@
           <a:cs typeface="+mn-cs"/>
         </a:defRPr>
       </a:lvl7pPr>
-      <a:lvl8pPr marL="1938414" indent="-129228" algn="l" defTabSz="516910" rtl="0" eaLnBrk="1" latinLnBrk="0" hangingPunct="1">
+      <a:lvl8pPr marL="2286114" indent="-152408" algn="l" defTabSz="609630" rtl="0" eaLnBrk="1" latinLnBrk="0" hangingPunct="1">
         <a:lnSpc>
           <a:spcPct val="90000"/>
         </a:lnSpc>
         <a:spcBef>
-          <a:spcPts val="283"/>
+          <a:spcPts val="333"/>
         </a:spcBef>
         <a:buFont typeface="Arial" panose="020B0604020202020204" pitchFamily="34" charset="0"/>
         <a:buChar char="•"/>
-        <a:defRPr sz="1018" kern="1200">
+        <a:defRPr sz="1200" kern="1200">
           <a:solidFill>
             <a:schemeClr val="tx1"/>
           </a:solidFill>
@@ -2833,16 +2838,16 @@
           <a:cs typeface="+mn-cs"/>
         </a:defRPr>
       </a:lvl8pPr>
-      <a:lvl9pPr marL="2196869" indent="-129228" algn="l" defTabSz="516910" rtl="0" eaLnBrk="1" latinLnBrk="0" hangingPunct="1">
+      <a:lvl9pPr marL="2590930" indent="-152408" algn="l" defTabSz="609630" rtl="0" eaLnBrk="1" latinLnBrk="0" hangingPunct="1">
         <a:lnSpc>
           <a:spcPct val="90000"/>
         </a:lnSpc>
         <a:spcBef>
-          <a:spcPts val="283"/>
+          <a:spcPts val="333"/>
         </a:spcBef>
         <a:buFont typeface="Arial" panose="020B0604020202020204" pitchFamily="34" charset="0"/>
         <a:buChar char="•"/>
-        <a:defRPr sz="1018" kern="1200">
+        <a:defRPr sz="1200" kern="1200">
           <a:solidFill>
             <a:schemeClr val="tx1"/>
           </a:solidFill>
@@ -2856,8 +2861,8 @@
       <a:defPPr>
         <a:defRPr lang="en-US"/>
       </a:defPPr>
-      <a:lvl1pPr marL="0" algn="l" defTabSz="516910" rtl="0" eaLnBrk="1" latinLnBrk="0" hangingPunct="1">
-        <a:defRPr sz="1018" kern="1200">
+      <a:lvl1pPr marL="0" algn="l" defTabSz="609630" rtl="0" eaLnBrk="1" latinLnBrk="0" hangingPunct="1">
+        <a:defRPr sz="1200" kern="1200">
           <a:solidFill>
             <a:schemeClr val="tx1"/>
           </a:solidFill>
@@ -2866,8 +2871,8 @@
           <a:cs typeface="+mn-cs"/>
         </a:defRPr>
       </a:lvl1pPr>
-      <a:lvl2pPr marL="258455" algn="l" defTabSz="516910" rtl="0" eaLnBrk="1" latinLnBrk="0" hangingPunct="1">
-        <a:defRPr sz="1018" kern="1200">
+      <a:lvl2pPr marL="304815" algn="l" defTabSz="609630" rtl="0" eaLnBrk="1" latinLnBrk="0" hangingPunct="1">
+        <a:defRPr sz="1200" kern="1200">
           <a:solidFill>
             <a:schemeClr val="tx1"/>
           </a:solidFill>
@@ -2876,8 +2881,8 @@
           <a:cs typeface="+mn-cs"/>
         </a:defRPr>
       </a:lvl2pPr>
-      <a:lvl3pPr marL="516910" algn="l" defTabSz="516910" rtl="0" eaLnBrk="1" latinLnBrk="0" hangingPunct="1">
-        <a:defRPr sz="1018" kern="1200">
+      <a:lvl3pPr marL="609630" algn="l" defTabSz="609630" rtl="0" eaLnBrk="1" latinLnBrk="0" hangingPunct="1">
+        <a:defRPr sz="1200" kern="1200">
           <a:solidFill>
             <a:schemeClr val="tx1"/>
           </a:solidFill>
@@ -2886,8 +2891,8 @@
           <a:cs typeface="+mn-cs"/>
         </a:defRPr>
       </a:lvl3pPr>
-      <a:lvl4pPr marL="775365" algn="l" defTabSz="516910" rtl="0" eaLnBrk="1" latinLnBrk="0" hangingPunct="1">
-        <a:defRPr sz="1018" kern="1200">
+      <a:lvl4pPr marL="914446" algn="l" defTabSz="609630" rtl="0" eaLnBrk="1" latinLnBrk="0" hangingPunct="1">
+        <a:defRPr sz="1200" kern="1200">
           <a:solidFill>
             <a:schemeClr val="tx1"/>
           </a:solidFill>
@@ -2896,8 +2901,8 @@
           <a:cs typeface="+mn-cs"/>
         </a:defRPr>
       </a:lvl4pPr>
-      <a:lvl5pPr marL="1033821" algn="l" defTabSz="516910" rtl="0" eaLnBrk="1" latinLnBrk="0" hangingPunct="1">
-        <a:defRPr sz="1018" kern="1200">
+      <a:lvl5pPr marL="1219261" algn="l" defTabSz="609630" rtl="0" eaLnBrk="1" latinLnBrk="0" hangingPunct="1">
+        <a:defRPr sz="1200" kern="1200">
           <a:solidFill>
             <a:schemeClr val="tx1"/>
           </a:solidFill>
@@ -2906,8 +2911,8 @@
           <a:cs typeface="+mn-cs"/>
         </a:defRPr>
       </a:lvl5pPr>
-      <a:lvl6pPr marL="1292276" algn="l" defTabSz="516910" rtl="0" eaLnBrk="1" latinLnBrk="0" hangingPunct="1">
-        <a:defRPr sz="1018" kern="1200">
+      <a:lvl6pPr marL="1524076" algn="l" defTabSz="609630" rtl="0" eaLnBrk="1" latinLnBrk="0" hangingPunct="1">
+        <a:defRPr sz="1200" kern="1200">
           <a:solidFill>
             <a:schemeClr val="tx1"/>
           </a:solidFill>
@@ -2916,8 +2921,8 @@
           <a:cs typeface="+mn-cs"/>
         </a:defRPr>
       </a:lvl6pPr>
-      <a:lvl7pPr marL="1550731" algn="l" defTabSz="516910" rtl="0" eaLnBrk="1" latinLnBrk="0" hangingPunct="1">
-        <a:defRPr sz="1018" kern="1200">
+      <a:lvl7pPr marL="1828891" algn="l" defTabSz="609630" rtl="0" eaLnBrk="1" latinLnBrk="0" hangingPunct="1">
+        <a:defRPr sz="1200" kern="1200">
           <a:solidFill>
             <a:schemeClr val="tx1"/>
           </a:solidFill>
@@ -2926,8 +2931,8 @@
           <a:cs typeface="+mn-cs"/>
         </a:defRPr>
       </a:lvl7pPr>
-      <a:lvl8pPr marL="1809186" algn="l" defTabSz="516910" rtl="0" eaLnBrk="1" latinLnBrk="0" hangingPunct="1">
-        <a:defRPr sz="1018" kern="1200">
+      <a:lvl8pPr marL="2133707" algn="l" defTabSz="609630" rtl="0" eaLnBrk="1" latinLnBrk="0" hangingPunct="1">
+        <a:defRPr sz="1200" kern="1200">
           <a:solidFill>
             <a:schemeClr val="tx1"/>
           </a:solidFill>
@@ -2936,8 +2941,8 @@
           <a:cs typeface="+mn-cs"/>
         </a:defRPr>
       </a:lvl8pPr>
-      <a:lvl9pPr marL="2067641" algn="l" defTabSz="516910" rtl="0" eaLnBrk="1" latinLnBrk="0" hangingPunct="1">
-        <a:defRPr sz="1018" kern="1200">
+      <a:lvl9pPr marL="2438522" algn="l" defTabSz="609630" rtl="0" eaLnBrk="1" latinLnBrk="0" hangingPunct="1">
+        <a:defRPr sz="1200" kern="1200">
           <a:solidFill>
             <a:schemeClr val="tx1"/>
           </a:solidFill>
@@ -2970,30 +2975,32 @@
       </p:grpSpPr>
       <p:grpSp>
         <p:nvGrpSpPr>
-          <p:cNvPr id="10" name="Group 9">
+          <p:cNvPr id="39" name="Group 38">
             <a:extLst>
               <a:ext uri="{FF2B5EF4-FFF2-40B4-BE49-F238E27FC236}">
-                <a16:creationId xmlns:a16="http://schemas.microsoft.com/office/drawing/2014/main" id="{FD57058C-E656-4262-8BC3-306438183924}"/>
+                <a16:creationId xmlns:a16="http://schemas.microsoft.com/office/drawing/2014/main" id="{7E845F57-F477-4D2B-9211-F7A527E5418C}"/>
               </a:ext>
             </a:extLst>
           </p:cNvPr>
-          <p:cNvGrpSpPr/>
+          <p:cNvGrpSpPr>
+            <a:grpSpLocks noChangeAspect="1"/>
+          </p:cNvGrpSpPr>
           <p:nvPr/>
         </p:nvGrpSpPr>
         <p:grpSpPr>
           <a:xfrm>
-            <a:off x="0" y="-1"/>
-            <a:ext cx="9144000" cy="3952875"/>
-            <a:chOff x="-1" y="0"/>
-            <a:chExt cx="9144001" cy="3891642"/>
+            <a:off x="275013" y="4816"/>
+            <a:ext cx="9013767" cy="4567184"/>
+            <a:chOff x="287382" y="252548"/>
+            <a:chExt cx="10655816" cy="5399193"/>
           </a:xfrm>
         </p:grpSpPr>
         <p:pic>
           <p:nvPicPr>
-            <p:cNvPr id="4" name="Picture 3">
+            <p:cNvPr id="40" name="Picture 39">
               <a:extLst>
                 <a:ext uri="{FF2B5EF4-FFF2-40B4-BE49-F238E27FC236}">
-                  <a16:creationId xmlns:a16="http://schemas.microsoft.com/office/drawing/2014/main" id="{D6676F78-BAE9-4AAC-9937-FC1018D8EAA2}"/>
+                  <a16:creationId xmlns:a16="http://schemas.microsoft.com/office/drawing/2014/main" id="{042E7644-59DC-4E5D-BE66-206C55548E50}"/>
                 </a:ext>
               </a:extLst>
             </p:cNvPr>
@@ -3016,98 +3023,20 @@
           </p:blipFill>
           <p:spPr>
             <a:xfrm>
-              <a:off x="0" y="0"/>
-              <a:ext cx="4572000" cy="3582650"/>
+              <a:off x="287382" y="252549"/>
+              <a:ext cx="6522721" cy="4648606"/>
             </a:xfrm>
             <a:prstGeom prst="rect">
               <a:avLst/>
             </a:prstGeom>
           </p:spPr>
         </p:pic>
-        <p:sp>
-          <p:nvSpPr>
-            <p:cNvPr id="6" name="TextBox 5">
+        <p:pic>
+          <p:nvPicPr>
+            <p:cNvPr id="41" name="Picture 40">
               <a:extLst>
                 <a:ext uri="{FF2B5EF4-FFF2-40B4-BE49-F238E27FC236}">
-                  <a16:creationId xmlns:a16="http://schemas.microsoft.com/office/drawing/2014/main" id="{6DFEADBD-ADFB-4C61-AF7C-6C99A407AC3E}"/>
-                </a:ext>
-              </a:extLst>
-            </p:cNvPr>
-            <p:cNvSpPr txBox="1"/>
-            <p:nvPr/>
-          </p:nvSpPr>
-          <p:spPr>
-            <a:xfrm>
-              <a:off x="-1" y="3505825"/>
-              <a:ext cx="4571999" cy="385817"/>
-            </a:xfrm>
-            <a:prstGeom prst="rect">
-              <a:avLst/>
-            </a:prstGeom>
-            <a:noFill/>
-          </p:spPr>
-          <p:txBody>
-            <a:bodyPr wrap="square" rtlCol="0">
-              <a:spAutoFit/>
-            </a:bodyPr>
-            <a:lstStyle/>
-            <a:p>
-              <a:pPr algn="ctr"/>
-              <a:r>
-                <a:rPr lang="en-US" sz="1526" dirty="0">
-                  <a:latin typeface="Arial" panose="020B0604020202020204" pitchFamily="34" charset="0"/>
-                  <a:cs typeface="Arial" panose="020B0604020202020204" pitchFamily="34" charset="0"/>
-                </a:rPr>
-                <a:t>(A) First Level Results</a:t>
-              </a:r>
-            </a:p>
-          </p:txBody>
-        </p:sp>
-        <p:sp>
-          <p:nvSpPr>
-            <p:cNvPr id="7" name="TextBox 6">
-              <a:extLst>
-                <a:ext uri="{FF2B5EF4-FFF2-40B4-BE49-F238E27FC236}">
-                  <a16:creationId xmlns:a16="http://schemas.microsoft.com/office/drawing/2014/main" id="{537B127A-F01D-4E99-8D35-14A7E019C547}"/>
-                </a:ext>
-              </a:extLst>
-            </p:cNvPr>
-            <p:cNvSpPr txBox="1"/>
-            <p:nvPr/>
-          </p:nvSpPr>
-          <p:spPr>
-            <a:xfrm>
-              <a:off x="4571999" y="3505825"/>
-              <a:ext cx="4571999" cy="385817"/>
-            </a:xfrm>
-            <a:prstGeom prst="rect">
-              <a:avLst/>
-            </a:prstGeom>
-            <a:noFill/>
-          </p:spPr>
-          <p:txBody>
-            <a:bodyPr wrap="square" rtlCol="0">
-              <a:spAutoFit/>
-            </a:bodyPr>
-            <a:lstStyle/>
-            <a:p>
-              <a:pPr algn="ctr"/>
-              <a:r>
-                <a:rPr lang="en-US" sz="1526" dirty="0">
-                  <a:latin typeface="Arial" panose="020B0604020202020204" pitchFamily="34" charset="0"/>
-                  <a:cs typeface="Arial" panose="020B0604020202020204" pitchFamily="34" charset="0"/>
-                </a:rPr>
-                <a:t>(B) Second Level Results</a:t>
-              </a:r>
-            </a:p>
-          </p:txBody>
-        </p:sp>
-        <p:pic>
-          <p:nvPicPr>
-            <p:cNvPr id="9" name="Picture 8">
-              <a:extLst>
-                <a:ext uri="{FF2B5EF4-FFF2-40B4-BE49-F238E27FC236}">
-                  <a16:creationId xmlns:a16="http://schemas.microsoft.com/office/drawing/2014/main" id="{35F58980-A2C7-42B7-B64F-7505B454F38D}"/>
+                  <a16:creationId xmlns:a16="http://schemas.microsoft.com/office/drawing/2014/main" id="{71F11F1A-BDDE-4709-A520-8A4699B20A80}"/>
                 </a:ext>
               </a:extLst>
             </p:cNvPr>
@@ -3129,20 +3058,845 @@
             </a:stretch>
           </p:blipFill>
           <p:spPr>
-            <a:xfrm>
-              <a:off x="4572000" y="0"/>
-              <a:ext cx="4572000" cy="3429000"/>
+            <a:xfrm rot="5400000">
+              <a:off x="6574370" y="1062031"/>
+              <a:ext cx="4648607" cy="3029642"/>
             </a:xfrm>
             <a:prstGeom prst="rect">
               <a:avLst/>
             </a:prstGeom>
           </p:spPr>
         </p:pic>
+        <p:sp>
+          <p:nvSpPr>
+            <p:cNvPr id="42" name="TextBox 41">
+              <a:extLst>
+                <a:ext uri="{FF2B5EF4-FFF2-40B4-BE49-F238E27FC236}">
+                  <a16:creationId xmlns:a16="http://schemas.microsoft.com/office/drawing/2014/main" id="{FF80968E-DAE5-45F1-9C9E-55118609C275}"/>
+                </a:ext>
+              </a:extLst>
+            </p:cNvPr>
+            <p:cNvSpPr txBox="1"/>
+            <p:nvPr/>
+          </p:nvSpPr>
+          <p:spPr>
+            <a:xfrm>
+              <a:off x="7564581" y="483132"/>
+              <a:ext cx="931817" cy="646331"/>
+            </a:xfrm>
+            <a:prstGeom prst="rect">
+              <a:avLst/>
+            </a:prstGeom>
+            <a:noFill/>
+          </p:spPr>
+          <p:txBody>
+            <a:bodyPr wrap="square" rtlCol="0">
+              <a:spAutoFit/>
+            </a:bodyPr>
+            <a:lstStyle/>
+            <a:p>
+              <a:pPr algn="ctr"/>
+              <a:r>
+                <a:rPr lang="en-US" sz="1200" dirty="0">
+                  <a:solidFill>
+                    <a:schemeClr val="bg1"/>
+                  </a:solidFill>
+                  <a:latin typeface="Arial" panose="020B0604020202020204" pitchFamily="34" charset="0"/>
+                  <a:cs typeface="Arial" panose="020B0604020202020204" pitchFamily="34" charset="0"/>
+                </a:rPr>
+                <a:t>Chunk 0</a:t>
+              </a:r>
+            </a:p>
+            <a:p>
+              <a:pPr algn="ctr"/>
+              <a:r>
+                <a:rPr lang="en-US" sz="1200" dirty="0">
+                  <a:solidFill>
+                    <a:schemeClr val="bg1"/>
+                  </a:solidFill>
+                  <a:latin typeface="Arial" panose="020B0604020202020204" pitchFamily="34" charset="0"/>
+                  <a:cs typeface="Arial" panose="020B0604020202020204" pitchFamily="34" charset="0"/>
+                </a:rPr>
+                <a:t>Print Time:</a:t>
+              </a:r>
+            </a:p>
+            <a:p>
+              <a:pPr algn="ctr"/>
+              <a:r>
+                <a:rPr lang="en-US" sz="1200" dirty="0">
+                  <a:solidFill>
+                    <a:schemeClr val="bg1"/>
+                  </a:solidFill>
+                  <a:latin typeface="Arial" panose="020B0604020202020204" pitchFamily="34" charset="0"/>
+                  <a:cs typeface="Arial" panose="020B0604020202020204" pitchFamily="34" charset="0"/>
+                </a:rPr>
+                <a:t>2253</a:t>
+              </a:r>
+            </a:p>
+          </p:txBody>
+        </p:sp>
+        <p:sp>
+          <p:nvSpPr>
+            <p:cNvPr id="43" name="TextBox 42">
+              <a:extLst>
+                <a:ext uri="{FF2B5EF4-FFF2-40B4-BE49-F238E27FC236}">
+                  <a16:creationId xmlns:a16="http://schemas.microsoft.com/office/drawing/2014/main" id="{45035D72-97EE-4CF3-9354-B88AC6BF5C0E}"/>
+                </a:ext>
+              </a:extLst>
+            </p:cNvPr>
+            <p:cNvSpPr txBox="1"/>
+            <p:nvPr/>
+          </p:nvSpPr>
+          <p:spPr>
+            <a:xfrm>
+              <a:off x="9300952" y="483132"/>
+              <a:ext cx="931817" cy="646331"/>
+            </a:xfrm>
+            <a:prstGeom prst="rect">
+              <a:avLst/>
+            </a:prstGeom>
+            <a:noFill/>
+          </p:spPr>
+          <p:txBody>
+            <a:bodyPr wrap="square" rtlCol="0">
+              <a:spAutoFit/>
+            </a:bodyPr>
+            <a:lstStyle/>
+            <a:p>
+              <a:pPr algn="ctr"/>
+              <a:r>
+                <a:rPr lang="en-US" sz="1200" dirty="0">
+                  <a:solidFill>
+                    <a:schemeClr val="bg1"/>
+                  </a:solidFill>
+                  <a:latin typeface="Arial" panose="020B0604020202020204" pitchFamily="34" charset="0"/>
+                  <a:cs typeface="Arial" panose="020B0604020202020204" pitchFamily="34" charset="0"/>
+                </a:rPr>
+                <a:t>Chunk 1</a:t>
+              </a:r>
+            </a:p>
+            <a:p>
+              <a:pPr algn="ctr"/>
+              <a:r>
+                <a:rPr lang="en-US" sz="1200" dirty="0">
+                  <a:solidFill>
+                    <a:schemeClr val="bg1"/>
+                  </a:solidFill>
+                  <a:latin typeface="Arial" panose="020B0604020202020204" pitchFamily="34" charset="0"/>
+                  <a:cs typeface="Arial" panose="020B0604020202020204" pitchFamily="34" charset="0"/>
+                </a:rPr>
+                <a:t>Print Time:</a:t>
+              </a:r>
+            </a:p>
+            <a:p>
+              <a:pPr algn="ctr"/>
+              <a:r>
+                <a:rPr lang="en-US" sz="1200" dirty="0">
+                  <a:solidFill>
+                    <a:schemeClr val="bg1"/>
+                  </a:solidFill>
+                  <a:latin typeface="Arial" panose="020B0604020202020204" pitchFamily="34" charset="0"/>
+                  <a:cs typeface="Arial" panose="020B0604020202020204" pitchFamily="34" charset="0"/>
+                </a:rPr>
+                <a:t>1899</a:t>
+              </a:r>
+            </a:p>
+          </p:txBody>
+        </p:sp>
+        <p:sp>
+          <p:nvSpPr>
+            <p:cNvPr id="44" name="TextBox 43">
+              <a:extLst>
+                <a:ext uri="{FF2B5EF4-FFF2-40B4-BE49-F238E27FC236}">
+                  <a16:creationId xmlns:a16="http://schemas.microsoft.com/office/drawing/2014/main" id="{D25D69CE-0D73-44A9-B054-C600A4A9DB68}"/>
+                </a:ext>
+              </a:extLst>
+            </p:cNvPr>
+            <p:cNvSpPr txBox="1"/>
+            <p:nvPr/>
+          </p:nvSpPr>
+          <p:spPr>
+            <a:xfrm>
+              <a:off x="7564580" y="2203217"/>
+              <a:ext cx="931817" cy="646331"/>
+            </a:xfrm>
+            <a:prstGeom prst="rect">
+              <a:avLst/>
+            </a:prstGeom>
+            <a:noFill/>
+          </p:spPr>
+          <p:txBody>
+            <a:bodyPr wrap="square" rtlCol="0">
+              <a:spAutoFit/>
+            </a:bodyPr>
+            <a:lstStyle/>
+            <a:p>
+              <a:pPr algn="ctr"/>
+              <a:r>
+                <a:rPr lang="en-US" sz="1200" dirty="0">
+                  <a:solidFill>
+                    <a:schemeClr val="bg1"/>
+                  </a:solidFill>
+                  <a:latin typeface="Arial" panose="020B0604020202020204" pitchFamily="34" charset="0"/>
+                  <a:cs typeface="Arial" panose="020B0604020202020204" pitchFamily="34" charset="0"/>
+                </a:rPr>
+                <a:t>Chunk 2</a:t>
+              </a:r>
+            </a:p>
+            <a:p>
+              <a:pPr algn="ctr"/>
+              <a:r>
+                <a:rPr lang="en-US" sz="1200" dirty="0">
+                  <a:solidFill>
+                    <a:schemeClr val="bg1"/>
+                  </a:solidFill>
+                  <a:latin typeface="Arial" panose="020B0604020202020204" pitchFamily="34" charset="0"/>
+                  <a:cs typeface="Arial" panose="020B0604020202020204" pitchFamily="34" charset="0"/>
+                </a:rPr>
+                <a:t>Print Time:</a:t>
+              </a:r>
+            </a:p>
+            <a:p>
+              <a:pPr algn="ctr"/>
+              <a:r>
+                <a:rPr lang="en-US" sz="1200" dirty="0">
+                  <a:solidFill>
+                    <a:schemeClr val="bg1"/>
+                  </a:solidFill>
+                  <a:latin typeface="Arial" panose="020B0604020202020204" pitchFamily="34" charset="0"/>
+                  <a:cs typeface="Arial" panose="020B0604020202020204" pitchFamily="34" charset="0"/>
+                </a:rPr>
+                <a:t>2929</a:t>
+              </a:r>
+            </a:p>
+          </p:txBody>
+        </p:sp>
+        <p:sp>
+          <p:nvSpPr>
+            <p:cNvPr id="45" name="TextBox 44">
+              <a:extLst>
+                <a:ext uri="{FF2B5EF4-FFF2-40B4-BE49-F238E27FC236}">
+                  <a16:creationId xmlns:a16="http://schemas.microsoft.com/office/drawing/2014/main" id="{5B6BB447-F194-410A-926A-67FA12713FA2}"/>
+                </a:ext>
+              </a:extLst>
+            </p:cNvPr>
+            <p:cNvSpPr txBox="1"/>
+            <p:nvPr/>
+          </p:nvSpPr>
+          <p:spPr>
+            <a:xfrm>
+              <a:off x="9300952" y="2203217"/>
+              <a:ext cx="931817" cy="646331"/>
+            </a:xfrm>
+            <a:prstGeom prst="rect">
+              <a:avLst/>
+            </a:prstGeom>
+            <a:noFill/>
+          </p:spPr>
+          <p:txBody>
+            <a:bodyPr wrap="square" rtlCol="0">
+              <a:spAutoFit/>
+            </a:bodyPr>
+            <a:lstStyle/>
+            <a:p>
+              <a:pPr algn="ctr"/>
+              <a:r>
+                <a:rPr lang="en-US" sz="1200" dirty="0">
+                  <a:solidFill>
+                    <a:schemeClr val="bg1"/>
+                  </a:solidFill>
+                  <a:latin typeface="Arial" panose="020B0604020202020204" pitchFamily="34" charset="0"/>
+                  <a:cs typeface="Arial" panose="020B0604020202020204" pitchFamily="34" charset="0"/>
+                </a:rPr>
+                <a:t>Chunk 3</a:t>
+              </a:r>
+            </a:p>
+            <a:p>
+              <a:pPr algn="ctr"/>
+              <a:r>
+                <a:rPr lang="en-US" sz="1200" dirty="0">
+                  <a:solidFill>
+                    <a:schemeClr val="bg1"/>
+                  </a:solidFill>
+                  <a:latin typeface="Arial" panose="020B0604020202020204" pitchFamily="34" charset="0"/>
+                  <a:cs typeface="Arial" panose="020B0604020202020204" pitchFamily="34" charset="0"/>
+                </a:rPr>
+                <a:t>Print Time:</a:t>
+              </a:r>
+            </a:p>
+            <a:p>
+              <a:pPr algn="ctr"/>
+              <a:r>
+                <a:rPr lang="en-US" sz="1200" dirty="0">
+                  <a:solidFill>
+                    <a:schemeClr val="bg1"/>
+                  </a:solidFill>
+                  <a:latin typeface="Arial" panose="020B0604020202020204" pitchFamily="34" charset="0"/>
+                  <a:cs typeface="Arial" panose="020B0604020202020204" pitchFamily="34" charset="0"/>
+                </a:rPr>
+                <a:t>2490</a:t>
+              </a:r>
+            </a:p>
+          </p:txBody>
+        </p:sp>
+        <p:sp>
+          <p:nvSpPr>
+            <p:cNvPr id="46" name="TextBox 45">
+              <a:extLst>
+                <a:ext uri="{FF2B5EF4-FFF2-40B4-BE49-F238E27FC236}">
+                  <a16:creationId xmlns:a16="http://schemas.microsoft.com/office/drawing/2014/main" id="{5B3C20FE-914B-44D4-9728-171B59DA01F5}"/>
+                </a:ext>
+              </a:extLst>
+            </p:cNvPr>
+            <p:cNvSpPr txBox="1"/>
+            <p:nvPr/>
+          </p:nvSpPr>
+          <p:spPr>
+            <a:xfrm>
+              <a:off x="7564581" y="3780858"/>
+              <a:ext cx="931817" cy="646331"/>
+            </a:xfrm>
+            <a:prstGeom prst="rect">
+              <a:avLst/>
+            </a:prstGeom>
+            <a:noFill/>
+          </p:spPr>
+          <p:txBody>
+            <a:bodyPr wrap="square" rtlCol="0">
+              <a:spAutoFit/>
+            </a:bodyPr>
+            <a:lstStyle/>
+            <a:p>
+              <a:pPr algn="ctr"/>
+              <a:r>
+                <a:rPr lang="en-US" sz="1200" dirty="0">
+                  <a:solidFill>
+                    <a:schemeClr val="bg1"/>
+                  </a:solidFill>
+                  <a:latin typeface="Arial" panose="020B0604020202020204" pitchFamily="34" charset="0"/>
+                  <a:cs typeface="Arial" panose="020B0604020202020204" pitchFamily="34" charset="0"/>
+                </a:rPr>
+                <a:t>Chunk 4</a:t>
+              </a:r>
+            </a:p>
+            <a:p>
+              <a:pPr algn="ctr"/>
+              <a:r>
+                <a:rPr lang="en-US" sz="1200" dirty="0">
+                  <a:solidFill>
+                    <a:schemeClr val="bg1"/>
+                  </a:solidFill>
+                  <a:latin typeface="Arial" panose="020B0604020202020204" pitchFamily="34" charset="0"/>
+                  <a:cs typeface="Arial" panose="020B0604020202020204" pitchFamily="34" charset="0"/>
+                </a:rPr>
+                <a:t>Print Time:</a:t>
+              </a:r>
+            </a:p>
+            <a:p>
+              <a:pPr algn="ctr"/>
+              <a:r>
+                <a:rPr lang="en-US" sz="1200" dirty="0">
+                  <a:solidFill>
+                    <a:schemeClr val="bg1"/>
+                  </a:solidFill>
+                  <a:latin typeface="Arial" panose="020B0604020202020204" pitchFamily="34" charset="0"/>
+                  <a:cs typeface="Arial" panose="020B0604020202020204" pitchFamily="34" charset="0"/>
+                </a:rPr>
+                <a:t>1429</a:t>
+              </a:r>
+            </a:p>
+          </p:txBody>
+        </p:sp>
+        <p:sp>
+          <p:nvSpPr>
+            <p:cNvPr id="47" name="TextBox 46">
+              <a:extLst>
+                <a:ext uri="{FF2B5EF4-FFF2-40B4-BE49-F238E27FC236}">
+                  <a16:creationId xmlns:a16="http://schemas.microsoft.com/office/drawing/2014/main" id="{583FCF5C-07F8-4723-891B-B80D71B7CB9E}"/>
+                </a:ext>
+              </a:extLst>
+            </p:cNvPr>
+            <p:cNvSpPr txBox="1"/>
+            <p:nvPr/>
+          </p:nvSpPr>
+          <p:spPr>
+            <a:xfrm>
+              <a:off x="9300951" y="3780858"/>
+              <a:ext cx="931817" cy="646331"/>
+            </a:xfrm>
+            <a:prstGeom prst="rect">
+              <a:avLst/>
+            </a:prstGeom>
+            <a:noFill/>
+          </p:spPr>
+          <p:txBody>
+            <a:bodyPr wrap="square" rtlCol="0">
+              <a:spAutoFit/>
+            </a:bodyPr>
+            <a:lstStyle/>
+            <a:p>
+              <a:pPr algn="ctr"/>
+              <a:r>
+                <a:rPr lang="en-US" sz="1200" dirty="0">
+                  <a:solidFill>
+                    <a:schemeClr val="bg1"/>
+                  </a:solidFill>
+                  <a:latin typeface="Arial" panose="020B0604020202020204" pitchFamily="34" charset="0"/>
+                  <a:cs typeface="Arial" panose="020B0604020202020204" pitchFamily="34" charset="0"/>
+                </a:rPr>
+                <a:t>Chunk 5</a:t>
+              </a:r>
+            </a:p>
+            <a:p>
+              <a:pPr algn="ctr"/>
+              <a:r>
+                <a:rPr lang="en-US" sz="1200" dirty="0">
+                  <a:solidFill>
+                    <a:schemeClr val="bg1"/>
+                  </a:solidFill>
+                  <a:latin typeface="Arial" panose="020B0604020202020204" pitchFamily="34" charset="0"/>
+                  <a:cs typeface="Arial" panose="020B0604020202020204" pitchFamily="34" charset="0"/>
+                </a:rPr>
+                <a:t>Print Time:</a:t>
+              </a:r>
+            </a:p>
+            <a:p>
+              <a:pPr algn="ctr"/>
+              <a:r>
+                <a:rPr lang="en-US" sz="1200" dirty="0">
+                  <a:solidFill>
+                    <a:schemeClr val="bg1"/>
+                  </a:solidFill>
+                  <a:latin typeface="Arial" panose="020B0604020202020204" pitchFamily="34" charset="0"/>
+                  <a:cs typeface="Arial" panose="020B0604020202020204" pitchFamily="34" charset="0"/>
+                </a:rPr>
+                <a:t>1236</a:t>
+              </a:r>
+            </a:p>
+          </p:txBody>
+        </p:sp>
+        <p:cxnSp>
+          <p:nvCxnSpPr>
+            <p:cNvPr id="48" name="Straight Arrow Connector 47">
+              <a:extLst>
+                <a:ext uri="{FF2B5EF4-FFF2-40B4-BE49-F238E27FC236}">
+                  <a16:creationId xmlns:a16="http://schemas.microsoft.com/office/drawing/2014/main" id="{599BE48B-0015-4E15-93F7-A4B25E72DBC1}"/>
+                </a:ext>
+              </a:extLst>
+            </p:cNvPr>
+            <p:cNvCxnSpPr>
+              <a:cxnSpLocks/>
+              <a:stCxn id="43" idx="1"/>
+              <a:endCxn id="42" idx="3"/>
+            </p:cNvCxnSpPr>
+            <p:nvPr/>
+          </p:nvCxnSpPr>
+          <p:spPr>
+            <a:xfrm flipH="1">
+              <a:off x="8496398" y="806297"/>
+              <a:ext cx="804554" cy="0"/>
+            </a:xfrm>
+            <a:prstGeom prst="straightConnector1">
+              <a:avLst/>
+            </a:prstGeom>
+            <a:ln>
+              <a:solidFill>
+                <a:srgbClr val="FF0000"/>
+              </a:solidFill>
+              <a:tailEnd type="triangle"/>
+            </a:ln>
+          </p:spPr>
+          <p:style>
+            <a:lnRef idx="1">
+              <a:schemeClr val="accent1"/>
+            </a:lnRef>
+            <a:fillRef idx="0">
+              <a:schemeClr val="accent1"/>
+            </a:fillRef>
+            <a:effectRef idx="0">
+              <a:schemeClr val="accent1"/>
+            </a:effectRef>
+            <a:fontRef idx="minor">
+              <a:schemeClr val="tx1"/>
+            </a:fontRef>
+          </p:style>
+        </p:cxnSp>
+        <p:cxnSp>
+          <p:nvCxnSpPr>
+            <p:cNvPr id="49" name="Straight Arrow Connector 48">
+              <a:extLst>
+                <a:ext uri="{FF2B5EF4-FFF2-40B4-BE49-F238E27FC236}">
+                  <a16:creationId xmlns:a16="http://schemas.microsoft.com/office/drawing/2014/main" id="{798837F7-E3C8-4598-A7C4-2F79FE6E37EA}"/>
+                </a:ext>
+              </a:extLst>
+            </p:cNvPr>
+            <p:cNvCxnSpPr>
+              <a:cxnSpLocks/>
+              <a:stCxn id="45" idx="1"/>
+              <a:endCxn id="44" idx="3"/>
+            </p:cNvCxnSpPr>
+            <p:nvPr/>
+          </p:nvCxnSpPr>
+          <p:spPr>
+            <a:xfrm flipH="1">
+              <a:off x="8496397" y="2526382"/>
+              <a:ext cx="804555" cy="0"/>
+            </a:xfrm>
+            <a:prstGeom prst="straightConnector1">
+              <a:avLst/>
+            </a:prstGeom>
+            <a:ln>
+              <a:solidFill>
+                <a:srgbClr val="FF0000"/>
+              </a:solidFill>
+              <a:tailEnd type="triangle"/>
+            </a:ln>
+          </p:spPr>
+          <p:style>
+            <a:lnRef idx="1">
+              <a:schemeClr val="accent1"/>
+            </a:lnRef>
+            <a:fillRef idx="0">
+              <a:schemeClr val="accent1"/>
+            </a:fillRef>
+            <a:effectRef idx="0">
+              <a:schemeClr val="accent1"/>
+            </a:effectRef>
+            <a:fontRef idx="minor">
+              <a:schemeClr val="tx1"/>
+            </a:fontRef>
+          </p:style>
+        </p:cxnSp>
+        <p:cxnSp>
+          <p:nvCxnSpPr>
+            <p:cNvPr id="50" name="Straight Arrow Connector 49">
+              <a:extLst>
+                <a:ext uri="{FF2B5EF4-FFF2-40B4-BE49-F238E27FC236}">
+                  <a16:creationId xmlns:a16="http://schemas.microsoft.com/office/drawing/2014/main" id="{17A6C106-FE6F-4B53-8B41-61C38371F97A}"/>
+                </a:ext>
+              </a:extLst>
+            </p:cNvPr>
+            <p:cNvCxnSpPr>
+              <a:cxnSpLocks/>
+              <a:stCxn id="47" idx="1"/>
+              <a:endCxn id="46" idx="3"/>
+            </p:cNvCxnSpPr>
+            <p:nvPr/>
+          </p:nvCxnSpPr>
+          <p:spPr>
+            <a:xfrm flipH="1">
+              <a:off x="8496398" y="4104024"/>
+              <a:ext cx="804553" cy="0"/>
+            </a:xfrm>
+            <a:prstGeom prst="straightConnector1">
+              <a:avLst/>
+            </a:prstGeom>
+            <a:ln>
+              <a:solidFill>
+                <a:srgbClr val="FF0000"/>
+              </a:solidFill>
+              <a:tailEnd type="triangle"/>
+            </a:ln>
+          </p:spPr>
+          <p:style>
+            <a:lnRef idx="1">
+              <a:schemeClr val="accent1"/>
+            </a:lnRef>
+            <a:fillRef idx="0">
+              <a:schemeClr val="accent1"/>
+            </a:fillRef>
+            <a:effectRef idx="0">
+              <a:schemeClr val="accent1"/>
+            </a:effectRef>
+            <a:fontRef idx="minor">
+              <a:schemeClr val="tx1"/>
+            </a:fontRef>
+          </p:style>
+        </p:cxnSp>
+        <p:cxnSp>
+          <p:nvCxnSpPr>
+            <p:cNvPr id="51" name="Straight Arrow Connector 50">
+              <a:extLst>
+                <a:ext uri="{FF2B5EF4-FFF2-40B4-BE49-F238E27FC236}">
+                  <a16:creationId xmlns:a16="http://schemas.microsoft.com/office/drawing/2014/main" id="{CCAEB725-399B-4562-B033-02AB680F7262}"/>
+                </a:ext>
+              </a:extLst>
+            </p:cNvPr>
+            <p:cNvCxnSpPr>
+              <a:cxnSpLocks/>
+              <a:stCxn id="46" idx="0"/>
+              <a:endCxn id="44" idx="2"/>
+            </p:cNvCxnSpPr>
+            <p:nvPr/>
+          </p:nvCxnSpPr>
+          <p:spPr>
+            <a:xfrm flipH="1" flipV="1">
+              <a:off x="8030489" y="3134526"/>
+              <a:ext cx="1" cy="646332"/>
+            </a:xfrm>
+            <a:prstGeom prst="straightConnector1">
+              <a:avLst/>
+            </a:prstGeom>
+            <a:ln>
+              <a:solidFill>
+                <a:srgbClr val="FF0000"/>
+              </a:solidFill>
+              <a:tailEnd type="triangle"/>
+            </a:ln>
+          </p:spPr>
+          <p:style>
+            <a:lnRef idx="1">
+              <a:schemeClr val="accent1"/>
+            </a:lnRef>
+            <a:fillRef idx="0">
+              <a:schemeClr val="accent1"/>
+            </a:fillRef>
+            <a:effectRef idx="0">
+              <a:schemeClr val="accent1"/>
+            </a:effectRef>
+            <a:fontRef idx="minor">
+              <a:schemeClr val="tx1"/>
+            </a:fontRef>
+          </p:style>
+        </p:cxnSp>
+        <p:cxnSp>
+          <p:nvCxnSpPr>
+            <p:cNvPr id="52" name="Straight Arrow Connector 51">
+              <a:extLst>
+                <a:ext uri="{FF2B5EF4-FFF2-40B4-BE49-F238E27FC236}">
+                  <a16:creationId xmlns:a16="http://schemas.microsoft.com/office/drawing/2014/main" id="{D93E2D4E-51A7-460D-828F-BB539457AA3B}"/>
+                </a:ext>
+              </a:extLst>
+            </p:cNvPr>
+            <p:cNvCxnSpPr>
+              <a:cxnSpLocks/>
+              <a:stCxn id="47" idx="0"/>
+              <a:endCxn id="45" idx="2"/>
+            </p:cNvCxnSpPr>
+            <p:nvPr/>
+          </p:nvCxnSpPr>
+          <p:spPr>
+            <a:xfrm flipV="1">
+              <a:off x="9766860" y="3134526"/>
+              <a:ext cx="1" cy="646332"/>
+            </a:xfrm>
+            <a:prstGeom prst="straightConnector1">
+              <a:avLst/>
+            </a:prstGeom>
+            <a:ln>
+              <a:solidFill>
+                <a:srgbClr val="FF0000"/>
+              </a:solidFill>
+              <a:tailEnd type="triangle"/>
+            </a:ln>
+          </p:spPr>
+          <p:style>
+            <a:lnRef idx="1">
+              <a:schemeClr val="accent1"/>
+            </a:lnRef>
+            <a:fillRef idx="0">
+              <a:schemeClr val="accent1"/>
+            </a:fillRef>
+            <a:effectRef idx="0">
+              <a:schemeClr val="accent1"/>
+            </a:effectRef>
+            <a:fontRef idx="minor">
+              <a:schemeClr val="tx1"/>
+            </a:fontRef>
+          </p:style>
+        </p:cxnSp>
+        <p:cxnSp>
+          <p:nvCxnSpPr>
+            <p:cNvPr id="53" name="Straight Arrow Connector 52">
+              <a:extLst>
+                <a:ext uri="{FF2B5EF4-FFF2-40B4-BE49-F238E27FC236}">
+                  <a16:creationId xmlns:a16="http://schemas.microsoft.com/office/drawing/2014/main" id="{055F69F8-BC73-40AC-B9A5-6EB8B62F17A7}"/>
+                </a:ext>
+              </a:extLst>
+            </p:cNvPr>
+            <p:cNvCxnSpPr>
+              <a:cxnSpLocks/>
+              <a:stCxn id="44" idx="0"/>
+              <a:endCxn id="42" idx="2"/>
+            </p:cNvCxnSpPr>
+            <p:nvPr/>
+          </p:nvCxnSpPr>
+          <p:spPr>
+            <a:xfrm flipV="1">
+              <a:off x="8030489" y="1129462"/>
+              <a:ext cx="1" cy="1073754"/>
+            </a:xfrm>
+            <a:prstGeom prst="straightConnector1">
+              <a:avLst/>
+            </a:prstGeom>
+            <a:ln>
+              <a:solidFill>
+                <a:srgbClr val="FF0000"/>
+              </a:solidFill>
+              <a:tailEnd type="triangle"/>
+            </a:ln>
+          </p:spPr>
+          <p:style>
+            <a:lnRef idx="1">
+              <a:schemeClr val="accent1"/>
+            </a:lnRef>
+            <a:fillRef idx="0">
+              <a:schemeClr val="accent1"/>
+            </a:fillRef>
+            <a:effectRef idx="0">
+              <a:schemeClr val="accent1"/>
+            </a:effectRef>
+            <a:fontRef idx="minor">
+              <a:schemeClr val="tx1"/>
+            </a:fontRef>
+          </p:style>
+        </p:cxnSp>
+        <p:cxnSp>
+          <p:nvCxnSpPr>
+            <p:cNvPr id="54" name="Straight Arrow Connector 53">
+              <a:extLst>
+                <a:ext uri="{FF2B5EF4-FFF2-40B4-BE49-F238E27FC236}">
+                  <a16:creationId xmlns:a16="http://schemas.microsoft.com/office/drawing/2014/main" id="{13D54304-05BD-4FC5-8DCB-D2075505596F}"/>
+                </a:ext>
+              </a:extLst>
+            </p:cNvPr>
+            <p:cNvCxnSpPr>
+              <a:cxnSpLocks/>
+              <a:stCxn id="45" idx="0"/>
+              <a:endCxn id="43" idx="2"/>
+            </p:cNvCxnSpPr>
+            <p:nvPr/>
+          </p:nvCxnSpPr>
+          <p:spPr>
+            <a:xfrm flipV="1">
+              <a:off x="9766861" y="1129462"/>
+              <a:ext cx="0" cy="1073754"/>
+            </a:xfrm>
+            <a:prstGeom prst="straightConnector1">
+              <a:avLst/>
+            </a:prstGeom>
+            <a:ln>
+              <a:solidFill>
+                <a:srgbClr val="FF0000"/>
+              </a:solidFill>
+              <a:tailEnd type="triangle"/>
+            </a:ln>
+          </p:spPr>
+          <p:style>
+            <a:lnRef idx="1">
+              <a:schemeClr val="accent1"/>
+            </a:lnRef>
+            <a:fillRef idx="0">
+              <a:schemeClr val="accent1"/>
+            </a:fillRef>
+            <a:effectRef idx="0">
+              <a:schemeClr val="accent1"/>
+            </a:effectRef>
+            <a:fontRef idx="minor">
+              <a:schemeClr val="tx1"/>
+            </a:fontRef>
+          </p:style>
+        </p:cxnSp>
+        <p:sp>
+          <p:nvSpPr>
+            <p:cNvPr id="55" name="TextBox 54">
+              <a:extLst>
+                <a:ext uri="{FF2B5EF4-FFF2-40B4-BE49-F238E27FC236}">
+                  <a16:creationId xmlns:a16="http://schemas.microsoft.com/office/drawing/2014/main" id="{853F2E35-564A-4A01-BE52-6BB37539D1B9}"/>
+                </a:ext>
+              </a:extLst>
+            </p:cNvPr>
+            <p:cNvSpPr txBox="1"/>
+            <p:nvPr/>
+          </p:nvSpPr>
+          <p:spPr>
+            <a:xfrm>
+              <a:off x="1750422" y="4901155"/>
+              <a:ext cx="3596640" cy="436614"/>
+            </a:xfrm>
+            <a:prstGeom prst="rect">
+              <a:avLst/>
+            </a:prstGeom>
+            <a:noFill/>
+          </p:spPr>
+          <p:txBody>
+            <a:bodyPr wrap="square" rtlCol="0">
+              <a:spAutoFit/>
+            </a:bodyPr>
+            <a:lstStyle/>
+            <a:p>
+              <a:pPr algn="ctr"/>
+              <a:r>
+                <a:rPr lang="en-US" dirty="0">
+                  <a:latin typeface="Arial" panose="020B0604020202020204" pitchFamily="34" charset="0"/>
+                  <a:cs typeface="Arial" panose="020B0604020202020204" pitchFamily="34" charset="0"/>
+                </a:rPr>
+                <a:t>(A) Tall Box Jobs</a:t>
+              </a:r>
+            </a:p>
+          </p:txBody>
+        </p:sp>
+        <p:sp>
+          <p:nvSpPr>
+            <p:cNvPr id="56" name="TextBox 55">
+              <a:extLst>
+                <a:ext uri="{FF2B5EF4-FFF2-40B4-BE49-F238E27FC236}">
+                  <a16:creationId xmlns:a16="http://schemas.microsoft.com/office/drawing/2014/main" id="{9AD20D12-D7C7-4AEF-A343-B880E5F9B4A2}"/>
+                </a:ext>
+              </a:extLst>
+            </p:cNvPr>
+            <p:cNvSpPr txBox="1"/>
+            <p:nvPr/>
+          </p:nvSpPr>
+          <p:spPr>
+            <a:xfrm>
+              <a:off x="6810102" y="4892800"/>
+              <a:ext cx="4133096" cy="758941"/>
+            </a:xfrm>
+            <a:prstGeom prst="rect">
+              <a:avLst/>
+            </a:prstGeom>
+            <a:noFill/>
+          </p:spPr>
+          <p:txBody>
+            <a:bodyPr wrap="square" rtlCol="0">
+              <a:spAutoFit/>
+            </a:bodyPr>
+            <a:lstStyle/>
+            <a:p>
+              <a:pPr algn="ctr"/>
+              <a:r>
+                <a:rPr lang="en-US" dirty="0">
+                  <a:latin typeface="Arial" panose="020B0604020202020204" pitchFamily="34" charset="0"/>
+                  <a:cs typeface="Arial" panose="020B0604020202020204" pitchFamily="34" charset="0"/>
+                </a:rPr>
+                <a:t>(B) Chunk Configuration </a:t>
+              </a:r>
+            </a:p>
+            <a:p>
+              <a:pPr algn="ctr"/>
+              <a:r>
+                <a:rPr lang="en-US">
+                  <a:latin typeface="Arial" panose="020B0604020202020204" pitchFamily="34" charset="0"/>
+                  <a:cs typeface="Arial" panose="020B0604020202020204" pitchFamily="34" charset="0"/>
+                </a:rPr>
+                <a:t>Jobs </a:t>
+              </a:r>
+              <a:r>
+                <a:rPr lang="en-US" dirty="0">
+                  <a:latin typeface="Arial" panose="020B0604020202020204" pitchFamily="34" charset="0"/>
+                  <a:cs typeface="Arial" panose="020B0604020202020204" pitchFamily="34" charset="0"/>
+                </a:rPr>
+                <a:t>0-3</a:t>
+              </a:r>
+            </a:p>
+          </p:txBody>
+        </p:sp>
       </p:grpSp>
     </p:spTree>
     <p:extLst>
       <p:ext uri="{BB962C8B-B14F-4D97-AF65-F5344CB8AC3E}">
-        <p14:creationId xmlns:p14="http://schemas.microsoft.com/office/powerpoint/2010/main" val="3470962880"/>
+        <p14:creationId xmlns:p14="http://schemas.microsoft.com/office/powerpoint/2010/main" val="654166409"/>
       </p:ext>
     </p:extLst>
   </p:cSld>

</xml_diff>